<commit_message>
Modulo 5 IU Para clase
</commit_message>
<xml_diff>
--- a/Presentaciones/05. Capa de Presentación.pptx
+++ b/Presentaciones/05. Capa de Presentación.pptx
@@ -5,7 +5,7 @@
     <p:sldMasterId id="2147483660" r:id="rId1"/>
   </p:sldMasterIdLst>
   <p:notesMasterIdLst>
-    <p:notesMasterId r:id="rId49"/>
+    <p:notesMasterId r:id="rId43"/>
   </p:notesMasterIdLst>
   <p:sldIdLst>
     <p:sldId id="256" r:id="rId2"/>
@@ -15,8 +15,8 @@
     <p:sldId id="300" r:id="rId6"/>
     <p:sldId id="301" r:id="rId7"/>
     <p:sldId id="302" r:id="rId8"/>
-    <p:sldId id="305" r:id="rId9"/>
-    <p:sldId id="303" r:id="rId10"/>
+    <p:sldId id="303" r:id="rId9"/>
+    <p:sldId id="305" r:id="rId10"/>
     <p:sldId id="304" r:id="rId11"/>
     <p:sldId id="257" r:id="rId12"/>
     <p:sldId id="265" r:id="rId13"/>
@@ -48,13 +48,7 @@
     <p:sldId id="286" r:id="rId39"/>
     <p:sldId id="287" r:id="rId40"/>
     <p:sldId id="285" r:id="rId41"/>
-    <p:sldId id="288" r:id="rId42"/>
-    <p:sldId id="289" r:id="rId43"/>
-    <p:sldId id="290" r:id="rId44"/>
-    <p:sldId id="291" r:id="rId45"/>
-    <p:sldId id="292" r:id="rId46"/>
-    <p:sldId id="294" r:id="rId47"/>
-    <p:sldId id="297" r:id="rId48"/>
+    <p:sldId id="297" r:id="rId42"/>
   </p:sldIdLst>
   <p:sldSz cx="9144000" cy="6858000" type="screen4x3"/>
   <p:notesSz cx="6858000" cy="9144000"/>
@@ -155,7 +149,7 @@
   </p:defaultTextStyle>
   <p:extLst>
     <p:ext uri="{EFAFB233-063F-42B5-8137-9DF3F51BA10A}">
-      <p15:sldGuideLst xmlns:p15="http://schemas.microsoft.com/office/powerpoint/2012/main">
+      <p15:sldGuideLst xmlns:p15="http://schemas.microsoft.com/office/powerpoint/2012/main" xmlns="">
         <p15:guide id="1" orient="horz" pos="2160">
           <p15:clr>
             <a:srgbClr val="A4A3A4"/>
@@ -255,7 +249,7 @@
           <a:p>
             <a:fld id="{3DD85863-6637-4524-A6D3-EB16AF32BB30}" type="datetimeFigureOut">
               <a:rPr lang="es-ES"/>
-              <a:t>22/05/2014</a:t>
+              <a:t>29/05/2014</a:t>
             </a:fld>
             <a:endParaRPr lang="es-ES"/>
           </a:p>
@@ -2920,510 +2914,6 @@
 </p:notes>
 </file>
 
-<file path=ppt/notesSlides/notesSlide31.xml><?xml version="1.0" encoding="utf-8"?>
-<p:notes xmlns:a="http://schemas.openxmlformats.org/drawingml/2006/main" xmlns:r="http://schemas.openxmlformats.org/officeDocument/2006/relationships" xmlns:p="http://schemas.openxmlformats.org/presentationml/2006/main">
-  <p:cSld>
-    <p:spTree>
-      <p:nvGrpSpPr>
-        <p:cNvPr id="1" name=""/>
-        <p:cNvGrpSpPr/>
-        <p:nvPr/>
-      </p:nvGrpSpPr>
-      <p:grpSpPr>
-        <a:xfrm>
-          <a:off x="0" y="0"/>
-          <a:ext cx="0" cy="0"/>
-          <a:chOff x="0" y="0"/>
-          <a:chExt cx="0" cy="0"/>
-        </a:xfrm>
-      </p:grpSpPr>
-      <p:sp>
-        <p:nvSpPr>
-          <p:cNvPr id="2" name="1 Marcador de imagen de diapositiva"/>
-          <p:cNvSpPr>
-            <a:spLocks noGrp="1" noRot="1" noChangeAspect="1"/>
-          </p:cNvSpPr>
-          <p:nvPr>
-            <p:ph type="sldImg"/>
-          </p:nvPr>
-        </p:nvSpPr>
-        <p:spPr/>
-      </p:sp>
-      <p:sp>
-        <p:nvSpPr>
-          <p:cNvPr id="3" name="2 Marcador de notas"/>
-          <p:cNvSpPr>
-            <a:spLocks noGrp="1"/>
-          </p:cNvSpPr>
-          <p:nvPr>
-            <p:ph type="body" idx="1"/>
-          </p:nvPr>
-        </p:nvSpPr>
-        <p:spPr/>
-        <p:txBody>
-          <a:bodyPr/>
-          <a:lstStyle/>
-          <a:p>
-            <a:endParaRPr lang="es-AR"/>
-          </a:p>
-        </p:txBody>
-      </p:sp>
-      <p:sp>
-        <p:nvSpPr>
-          <p:cNvPr id="4" name="3 Marcador de número de diapositiva"/>
-          <p:cNvSpPr>
-            <a:spLocks noGrp="1"/>
-          </p:cNvSpPr>
-          <p:nvPr>
-            <p:ph type="sldNum" sz="quarter" idx="10"/>
-          </p:nvPr>
-        </p:nvSpPr>
-        <p:spPr/>
-        <p:txBody>
-          <a:bodyPr/>
-          <a:lstStyle/>
-          <a:p>
-            <a:fld id="{4024C8D4-B0E7-4C71-8965-6F9CFFA6F3EA}" type="slidenum">
-              <a:rPr lang="es-ES" smtClean="0"/>
-              <a:t>41</a:t>
-            </a:fld>
-            <a:endParaRPr lang="es-ES"/>
-          </a:p>
-        </p:txBody>
-      </p:sp>
-    </p:spTree>
-    <p:extLst>
-      <p:ext uri="{BB962C8B-B14F-4D97-AF65-F5344CB8AC3E}">
-        <p14:creationId xmlns:p14="http://schemas.microsoft.com/office/powerpoint/2010/main" val="189492444"/>
-      </p:ext>
-    </p:extLst>
-  </p:cSld>
-  <p:clrMapOvr>
-    <a:masterClrMapping/>
-  </p:clrMapOvr>
-</p:notes>
-</file>
-
-<file path=ppt/notesSlides/notesSlide32.xml><?xml version="1.0" encoding="utf-8"?>
-<p:notes xmlns:a="http://schemas.openxmlformats.org/drawingml/2006/main" xmlns:r="http://schemas.openxmlformats.org/officeDocument/2006/relationships" xmlns:p="http://schemas.openxmlformats.org/presentationml/2006/main">
-  <p:cSld>
-    <p:spTree>
-      <p:nvGrpSpPr>
-        <p:cNvPr id="1" name=""/>
-        <p:cNvGrpSpPr/>
-        <p:nvPr/>
-      </p:nvGrpSpPr>
-      <p:grpSpPr>
-        <a:xfrm>
-          <a:off x="0" y="0"/>
-          <a:ext cx="0" cy="0"/>
-          <a:chOff x="0" y="0"/>
-          <a:chExt cx="0" cy="0"/>
-        </a:xfrm>
-      </p:grpSpPr>
-      <p:sp>
-        <p:nvSpPr>
-          <p:cNvPr id="2" name="1 Marcador de imagen de diapositiva"/>
-          <p:cNvSpPr>
-            <a:spLocks noGrp="1" noRot="1" noChangeAspect="1"/>
-          </p:cNvSpPr>
-          <p:nvPr>
-            <p:ph type="sldImg"/>
-          </p:nvPr>
-        </p:nvSpPr>
-        <p:spPr/>
-      </p:sp>
-      <p:sp>
-        <p:nvSpPr>
-          <p:cNvPr id="3" name="2 Marcador de notas"/>
-          <p:cNvSpPr>
-            <a:spLocks noGrp="1"/>
-          </p:cNvSpPr>
-          <p:nvPr>
-            <p:ph type="body" idx="1"/>
-          </p:nvPr>
-        </p:nvSpPr>
-        <p:spPr/>
-        <p:txBody>
-          <a:bodyPr/>
-          <a:lstStyle/>
-          <a:p>
-            <a:endParaRPr lang="es-AR"/>
-          </a:p>
-        </p:txBody>
-      </p:sp>
-      <p:sp>
-        <p:nvSpPr>
-          <p:cNvPr id="4" name="3 Marcador de número de diapositiva"/>
-          <p:cNvSpPr>
-            <a:spLocks noGrp="1"/>
-          </p:cNvSpPr>
-          <p:nvPr>
-            <p:ph type="sldNum" sz="quarter" idx="10"/>
-          </p:nvPr>
-        </p:nvSpPr>
-        <p:spPr/>
-        <p:txBody>
-          <a:bodyPr/>
-          <a:lstStyle/>
-          <a:p>
-            <a:fld id="{4024C8D4-B0E7-4C71-8965-6F9CFFA6F3EA}" type="slidenum">
-              <a:rPr lang="es-ES" smtClean="0"/>
-              <a:t>42</a:t>
-            </a:fld>
-            <a:endParaRPr lang="es-ES"/>
-          </a:p>
-        </p:txBody>
-      </p:sp>
-    </p:spTree>
-    <p:extLst>
-      <p:ext uri="{BB962C8B-B14F-4D97-AF65-F5344CB8AC3E}">
-        <p14:creationId xmlns:p14="http://schemas.microsoft.com/office/powerpoint/2010/main" val="786131441"/>
-      </p:ext>
-    </p:extLst>
-  </p:cSld>
-  <p:clrMapOvr>
-    <a:masterClrMapping/>
-  </p:clrMapOvr>
-</p:notes>
-</file>
-
-<file path=ppt/notesSlides/notesSlide33.xml><?xml version="1.0" encoding="utf-8"?>
-<p:notes xmlns:a="http://schemas.openxmlformats.org/drawingml/2006/main" xmlns:r="http://schemas.openxmlformats.org/officeDocument/2006/relationships" xmlns:p="http://schemas.openxmlformats.org/presentationml/2006/main">
-  <p:cSld>
-    <p:spTree>
-      <p:nvGrpSpPr>
-        <p:cNvPr id="1" name=""/>
-        <p:cNvGrpSpPr/>
-        <p:nvPr/>
-      </p:nvGrpSpPr>
-      <p:grpSpPr>
-        <a:xfrm>
-          <a:off x="0" y="0"/>
-          <a:ext cx="0" cy="0"/>
-          <a:chOff x="0" y="0"/>
-          <a:chExt cx="0" cy="0"/>
-        </a:xfrm>
-      </p:grpSpPr>
-      <p:sp>
-        <p:nvSpPr>
-          <p:cNvPr id="2" name="1 Marcador de imagen de diapositiva"/>
-          <p:cNvSpPr>
-            <a:spLocks noGrp="1" noRot="1" noChangeAspect="1"/>
-          </p:cNvSpPr>
-          <p:nvPr>
-            <p:ph type="sldImg"/>
-          </p:nvPr>
-        </p:nvSpPr>
-        <p:spPr/>
-      </p:sp>
-      <p:sp>
-        <p:nvSpPr>
-          <p:cNvPr id="3" name="2 Marcador de notas"/>
-          <p:cNvSpPr>
-            <a:spLocks noGrp="1"/>
-          </p:cNvSpPr>
-          <p:nvPr>
-            <p:ph type="body" idx="1"/>
-          </p:nvPr>
-        </p:nvSpPr>
-        <p:spPr/>
-        <p:txBody>
-          <a:bodyPr/>
-          <a:lstStyle/>
-          <a:p>
-            <a:endParaRPr lang="es-AR"/>
-          </a:p>
-        </p:txBody>
-      </p:sp>
-      <p:sp>
-        <p:nvSpPr>
-          <p:cNvPr id="4" name="3 Marcador de número de diapositiva"/>
-          <p:cNvSpPr>
-            <a:spLocks noGrp="1"/>
-          </p:cNvSpPr>
-          <p:nvPr>
-            <p:ph type="sldNum" sz="quarter" idx="10"/>
-          </p:nvPr>
-        </p:nvSpPr>
-        <p:spPr/>
-        <p:txBody>
-          <a:bodyPr/>
-          <a:lstStyle/>
-          <a:p>
-            <a:fld id="{4024C8D4-B0E7-4C71-8965-6F9CFFA6F3EA}" type="slidenum">
-              <a:rPr lang="es-ES" smtClean="0"/>
-              <a:t>43</a:t>
-            </a:fld>
-            <a:endParaRPr lang="es-ES"/>
-          </a:p>
-        </p:txBody>
-      </p:sp>
-    </p:spTree>
-    <p:extLst>
-      <p:ext uri="{BB962C8B-B14F-4D97-AF65-F5344CB8AC3E}">
-        <p14:creationId xmlns:p14="http://schemas.microsoft.com/office/powerpoint/2010/main" val="2597033653"/>
-      </p:ext>
-    </p:extLst>
-  </p:cSld>
-  <p:clrMapOvr>
-    <a:masterClrMapping/>
-  </p:clrMapOvr>
-</p:notes>
-</file>
-
-<file path=ppt/notesSlides/notesSlide34.xml><?xml version="1.0" encoding="utf-8"?>
-<p:notes xmlns:a="http://schemas.openxmlformats.org/drawingml/2006/main" xmlns:r="http://schemas.openxmlformats.org/officeDocument/2006/relationships" xmlns:p="http://schemas.openxmlformats.org/presentationml/2006/main">
-  <p:cSld>
-    <p:spTree>
-      <p:nvGrpSpPr>
-        <p:cNvPr id="1" name=""/>
-        <p:cNvGrpSpPr/>
-        <p:nvPr/>
-      </p:nvGrpSpPr>
-      <p:grpSpPr>
-        <a:xfrm>
-          <a:off x="0" y="0"/>
-          <a:ext cx="0" cy="0"/>
-          <a:chOff x="0" y="0"/>
-          <a:chExt cx="0" cy="0"/>
-        </a:xfrm>
-      </p:grpSpPr>
-      <p:sp>
-        <p:nvSpPr>
-          <p:cNvPr id="2" name="1 Marcador de imagen de diapositiva"/>
-          <p:cNvSpPr>
-            <a:spLocks noGrp="1" noRot="1" noChangeAspect="1"/>
-          </p:cNvSpPr>
-          <p:nvPr>
-            <p:ph type="sldImg"/>
-          </p:nvPr>
-        </p:nvSpPr>
-        <p:spPr/>
-      </p:sp>
-      <p:sp>
-        <p:nvSpPr>
-          <p:cNvPr id="3" name="2 Marcador de notas"/>
-          <p:cNvSpPr>
-            <a:spLocks noGrp="1"/>
-          </p:cNvSpPr>
-          <p:nvPr>
-            <p:ph type="body" idx="1"/>
-          </p:nvPr>
-        </p:nvSpPr>
-        <p:spPr/>
-        <p:txBody>
-          <a:bodyPr/>
-          <a:lstStyle/>
-          <a:p>
-            <a:endParaRPr lang="es-AR"/>
-          </a:p>
-        </p:txBody>
-      </p:sp>
-      <p:sp>
-        <p:nvSpPr>
-          <p:cNvPr id="4" name="3 Marcador de número de diapositiva"/>
-          <p:cNvSpPr>
-            <a:spLocks noGrp="1"/>
-          </p:cNvSpPr>
-          <p:nvPr>
-            <p:ph type="sldNum" sz="quarter" idx="10"/>
-          </p:nvPr>
-        </p:nvSpPr>
-        <p:spPr/>
-        <p:txBody>
-          <a:bodyPr/>
-          <a:lstStyle/>
-          <a:p>
-            <a:fld id="{4024C8D4-B0E7-4C71-8965-6F9CFFA6F3EA}" type="slidenum">
-              <a:rPr lang="es-ES" smtClean="0"/>
-              <a:t>44</a:t>
-            </a:fld>
-            <a:endParaRPr lang="es-ES"/>
-          </a:p>
-        </p:txBody>
-      </p:sp>
-    </p:spTree>
-    <p:extLst>
-      <p:ext uri="{BB962C8B-B14F-4D97-AF65-F5344CB8AC3E}">
-        <p14:creationId xmlns:p14="http://schemas.microsoft.com/office/powerpoint/2010/main" val="3409991132"/>
-      </p:ext>
-    </p:extLst>
-  </p:cSld>
-  <p:clrMapOvr>
-    <a:masterClrMapping/>
-  </p:clrMapOvr>
-</p:notes>
-</file>
-
-<file path=ppt/notesSlides/notesSlide35.xml><?xml version="1.0" encoding="utf-8"?>
-<p:notes xmlns:a="http://schemas.openxmlformats.org/drawingml/2006/main" xmlns:r="http://schemas.openxmlformats.org/officeDocument/2006/relationships" xmlns:p="http://schemas.openxmlformats.org/presentationml/2006/main">
-  <p:cSld>
-    <p:spTree>
-      <p:nvGrpSpPr>
-        <p:cNvPr id="1" name=""/>
-        <p:cNvGrpSpPr/>
-        <p:nvPr/>
-      </p:nvGrpSpPr>
-      <p:grpSpPr>
-        <a:xfrm>
-          <a:off x="0" y="0"/>
-          <a:ext cx="0" cy="0"/>
-          <a:chOff x="0" y="0"/>
-          <a:chExt cx="0" cy="0"/>
-        </a:xfrm>
-      </p:grpSpPr>
-      <p:sp>
-        <p:nvSpPr>
-          <p:cNvPr id="2" name="1 Marcador de imagen de diapositiva"/>
-          <p:cNvSpPr>
-            <a:spLocks noGrp="1" noRot="1" noChangeAspect="1"/>
-          </p:cNvSpPr>
-          <p:nvPr>
-            <p:ph type="sldImg"/>
-          </p:nvPr>
-        </p:nvSpPr>
-        <p:spPr/>
-      </p:sp>
-      <p:sp>
-        <p:nvSpPr>
-          <p:cNvPr id="3" name="2 Marcador de notas"/>
-          <p:cNvSpPr>
-            <a:spLocks noGrp="1"/>
-          </p:cNvSpPr>
-          <p:nvPr>
-            <p:ph type="body" idx="1"/>
-          </p:nvPr>
-        </p:nvSpPr>
-        <p:spPr/>
-        <p:txBody>
-          <a:bodyPr/>
-          <a:lstStyle/>
-          <a:p>
-            <a:endParaRPr lang="es-AR"/>
-          </a:p>
-        </p:txBody>
-      </p:sp>
-      <p:sp>
-        <p:nvSpPr>
-          <p:cNvPr id="4" name="3 Marcador de número de diapositiva"/>
-          <p:cNvSpPr>
-            <a:spLocks noGrp="1"/>
-          </p:cNvSpPr>
-          <p:nvPr>
-            <p:ph type="sldNum" sz="quarter" idx="10"/>
-          </p:nvPr>
-        </p:nvSpPr>
-        <p:spPr/>
-        <p:txBody>
-          <a:bodyPr/>
-          <a:lstStyle/>
-          <a:p>
-            <a:fld id="{4024C8D4-B0E7-4C71-8965-6F9CFFA6F3EA}" type="slidenum">
-              <a:rPr lang="es-ES" smtClean="0"/>
-              <a:t>45</a:t>
-            </a:fld>
-            <a:endParaRPr lang="es-ES"/>
-          </a:p>
-        </p:txBody>
-      </p:sp>
-    </p:spTree>
-    <p:extLst>
-      <p:ext uri="{BB962C8B-B14F-4D97-AF65-F5344CB8AC3E}">
-        <p14:creationId xmlns:p14="http://schemas.microsoft.com/office/powerpoint/2010/main" val="1075824190"/>
-      </p:ext>
-    </p:extLst>
-  </p:cSld>
-  <p:clrMapOvr>
-    <a:masterClrMapping/>
-  </p:clrMapOvr>
-</p:notes>
-</file>
-
-<file path=ppt/notesSlides/notesSlide36.xml><?xml version="1.0" encoding="utf-8"?>
-<p:notes xmlns:a="http://schemas.openxmlformats.org/drawingml/2006/main" xmlns:r="http://schemas.openxmlformats.org/officeDocument/2006/relationships" xmlns:p="http://schemas.openxmlformats.org/presentationml/2006/main">
-  <p:cSld>
-    <p:spTree>
-      <p:nvGrpSpPr>
-        <p:cNvPr id="1" name=""/>
-        <p:cNvGrpSpPr/>
-        <p:nvPr/>
-      </p:nvGrpSpPr>
-      <p:grpSpPr>
-        <a:xfrm>
-          <a:off x="0" y="0"/>
-          <a:ext cx="0" cy="0"/>
-          <a:chOff x="0" y="0"/>
-          <a:chExt cx="0" cy="0"/>
-        </a:xfrm>
-      </p:grpSpPr>
-      <p:sp>
-        <p:nvSpPr>
-          <p:cNvPr id="2" name="1 Marcador de imagen de diapositiva"/>
-          <p:cNvSpPr>
-            <a:spLocks noGrp="1" noRot="1" noChangeAspect="1"/>
-          </p:cNvSpPr>
-          <p:nvPr>
-            <p:ph type="sldImg"/>
-          </p:nvPr>
-        </p:nvSpPr>
-        <p:spPr/>
-      </p:sp>
-      <p:sp>
-        <p:nvSpPr>
-          <p:cNvPr id="3" name="2 Marcador de notas"/>
-          <p:cNvSpPr>
-            <a:spLocks noGrp="1"/>
-          </p:cNvSpPr>
-          <p:nvPr>
-            <p:ph type="body" idx="1"/>
-          </p:nvPr>
-        </p:nvSpPr>
-        <p:spPr/>
-        <p:txBody>
-          <a:bodyPr/>
-          <a:lstStyle/>
-          <a:p>
-            <a:endParaRPr lang="es-AR"/>
-          </a:p>
-        </p:txBody>
-      </p:sp>
-      <p:sp>
-        <p:nvSpPr>
-          <p:cNvPr id="4" name="3 Marcador de número de diapositiva"/>
-          <p:cNvSpPr>
-            <a:spLocks noGrp="1"/>
-          </p:cNvSpPr>
-          <p:nvPr>
-            <p:ph type="sldNum" sz="quarter" idx="10"/>
-          </p:nvPr>
-        </p:nvSpPr>
-        <p:spPr/>
-        <p:txBody>
-          <a:bodyPr/>
-          <a:lstStyle/>
-          <a:p>
-            <a:fld id="{4024C8D4-B0E7-4C71-8965-6F9CFFA6F3EA}" type="slidenum">
-              <a:rPr lang="es-ES" smtClean="0"/>
-              <a:t>46</a:t>
-            </a:fld>
-            <a:endParaRPr lang="es-ES"/>
-          </a:p>
-        </p:txBody>
-      </p:sp>
-    </p:spTree>
-    <p:extLst>
-      <p:ext uri="{BB962C8B-B14F-4D97-AF65-F5344CB8AC3E}">
-        <p14:creationId xmlns:p14="http://schemas.microsoft.com/office/powerpoint/2010/main" val="3396624917"/>
-      </p:ext>
-    </p:extLst>
-  </p:cSld>
-  <p:clrMapOvr>
-    <a:masterClrMapping/>
-  </p:clrMapOvr>
-</p:notes>
-</file>
-
 <file path=ppt/notesSlides/notesSlide4.xml><?xml version="1.0" encoding="utf-8"?>
 <p:notes xmlns:a="http://schemas.openxmlformats.org/drawingml/2006/main" xmlns:r="http://schemas.openxmlformats.org/officeDocument/2006/relationships" xmlns:p="http://schemas.openxmlformats.org/presentationml/2006/main">
   <p:cSld>
@@ -5740,7 +5230,7 @@
           <a:p>
             <a:fld id="{A04C6AF4-F79F-437B-B506-10B36C537217}" type="datetime1">
               <a:rPr lang="es-ES" smtClean="0"/>
-              <a:t>22/05/2014</a:t>
+              <a:t>29/05/2014</a:t>
             </a:fld>
             <a:endParaRPr lang="es-ES"/>
           </a:p>
@@ -5931,7 +5421,7 @@
           <a:p>
             <a:fld id="{5656C694-7582-426F-8C61-FD3E0B611955}" type="datetime1">
               <a:rPr lang="es-ES" smtClean="0"/>
-              <a:t>22/05/2014</a:t>
+              <a:t>29/05/2014</a:t>
             </a:fld>
             <a:endParaRPr lang="es-ES"/>
           </a:p>
@@ -6092,7 +5582,7 @@
           <a:p>
             <a:fld id="{E9B5DC75-3B26-41DC-A97B-DE9516ED76FE}" type="datetime1">
               <a:rPr lang="es-ES" smtClean="0"/>
-              <a:t>22/05/2014</a:t>
+              <a:t>29/05/2014</a:t>
             </a:fld>
             <a:endParaRPr lang="es-ES"/>
           </a:p>
@@ -7928,7 +7418,7 @@
           <a:p>
             <a:fld id="{89F5032E-2175-444E-9EC8-0A131EA1CD7F}" type="datetime1">
               <a:rPr lang="es-ES" smtClean="0"/>
-              <a:t>22/05/2014</a:t>
+              <a:t>29/05/2014</a:t>
             </a:fld>
             <a:endParaRPr lang="es-ES"/>
           </a:p>
@@ -9808,7 +9298,7 @@
           <a:p>
             <a:fld id="{8A1C177A-53FA-458A-91C2-325D3A0C1BF4}" type="datetime1">
               <a:rPr lang="es-ES" smtClean="0"/>
-              <a:t>22/05/2014</a:t>
+              <a:t>29/05/2014</a:t>
             </a:fld>
             <a:endParaRPr lang="es-ES"/>
           </a:p>
@@ -9931,7 +9421,7 @@
           <a:p>
             <a:fld id="{6B42998C-2F1D-4F99-952D-3EC5CA8B157B}" type="datetime1">
               <a:rPr lang="es-ES" smtClean="0"/>
-              <a:t>22/05/2014</a:t>
+              <a:t>29/05/2014</a:t>
             </a:fld>
             <a:endParaRPr lang="es-ES"/>
           </a:p>
@@ -10482,7 +9972,7 @@
           <a:p>
             <a:fld id="{44E8736F-E68D-4AEA-B6AA-A1BC21ACB61E}" type="datetime1">
               <a:rPr lang="es-ES" smtClean="0"/>
-              <a:t>22/05/2014</a:t>
+              <a:t>29/05/2014</a:t>
             </a:fld>
             <a:endParaRPr lang="es-ES"/>
           </a:p>
@@ -10605,7 +10095,7 @@
           <a:p>
             <a:fld id="{C050857F-C0E8-4D2B-B178-5E59321913A3}" type="datetime1">
               <a:rPr lang="es-ES" smtClean="0"/>
-              <a:t>22/05/2014</a:t>
+              <a:t>29/05/2014</a:t>
             </a:fld>
             <a:endParaRPr lang="es-ES"/>
           </a:p>
@@ -12326,7 +11816,7 @@
           <a:p>
             <a:fld id="{1230C67D-FFE6-4AA8-B82A-A82B52AF4C22}" type="datetime1">
               <a:rPr lang="es-ES" smtClean="0"/>
-              <a:t>22/05/2014</a:t>
+              <a:t>29/05/2014</a:t>
             </a:fld>
             <a:endParaRPr lang="es-ES"/>
           </a:p>
@@ -12487,7 +11977,7 @@
           <a:p>
             <a:fld id="{E2C84EA7-4396-4853-9001-86387F94B609}" type="datetime1">
               <a:rPr lang="es-ES" smtClean="0"/>
-              <a:t>22/05/2014</a:t>
+              <a:t>29/05/2014</a:t>
             </a:fld>
             <a:endParaRPr lang="es-ES"/>
           </a:p>
@@ -16112,7 +15602,7 @@
           <a:p>
             <a:fld id="{C4826A76-5670-4D87-8282-FFDEC44087F8}" type="datetime1">
               <a:rPr lang="es-ES" smtClean="0"/>
-              <a:t>22/05/2014</a:t>
+              <a:t>29/05/2014</a:t>
             </a:fld>
             <a:endParaRPr lang="es-ES"/>
           </a:p>
@@ -17981,7 +17471,7 @@
           <a:p>
             <a:fld id="{7C2BF56A-76E3-4200-A091-D5FCDD6100F7}" type="datetime1">
               <a:rPr lang="es-ES" smtClean="0"/>
-              <a:t>22/05/2014</a:t>
+              <a:t>29/05/2014</a:t>
             </a:fld>
             <a:endParaRPr lang="es-ES"/>
           </a:p>
@@ -18679,7 +18169,7 @@
           <a:p>
             <a:fld id="{89F5032E-2175-444E-9EC8-0A131EA1CD7F}" type="datetime1">
               <a:rPr lang="es-ES" smtClean="0"/>
-              <a:t>22/05/2014</a:t>
+              <a:t>29/05/2014</a:t>
             </a:fld>
             <a:endParaRPr lang="es-ES"/>
           </a:p>
@@ -18983,7 +18473,7 @@
           <a:p>
             <a:fld id="{E9E6B562-E743-4265-97AA-EDE2F289E966}" type="datetime1">
               <a:rPr lang="es-ES" smtClean="0"/>
-              <a:t>22/05/2014</a:t>
+              <a:t>29/05/2014</a:t>
             </a:fld>
             <a:endParaRPr lang="es-ES"/>
           </a:p>
@@ -19369,7 +18859,7 @@
           <a:p>
             <a:fld id="{729CC930-99A4-40E9-A273-06D00E6EF8AA}" type="datetime1">
               <a:rPr lang="es-ES" smtClean="0"/>
-              <a:t>22/05/2014</a:t>
+              <a:t>29/05/2014</a:t>
             </a:fld>
             <a:endParaRPr lang="es-ES"/>
           </a:p>
@@ -19686,7 +19176,7 @@
           <a:p>
             <a:fld id="{06B71802-3F5D-445F-8A39-883F4B01A845}" type="datetime1">
               <a:rPr lang="es-ES" smtClean="0"/>
-              <a:t>22/05/2014</a:t>
+              <a:t>29/05/2014</a:t>
             </a:fld>
             <a:endParaRPr lang="es-ES"/>
           </a:p>
@@ -19981,7 +19471,7 @@
           <a:p>
             <a:fld id="{96EFCF0E-5A75-41AA-A440-D40447FE4C2E}" type="datetime1">
               <a:rPr lang="es-ES" smtClean="0"/>
-              <a:t>22/05/2014</a:t>
+              <a:t>29/05/2014</a:t>
             </a:fld>
             <a:endParaRPr lang="es-ES"/>
           </a:p>
@@ -20276,7 +19766,7 @@
           <a:p>
             <a:fld id="{62E7C7A0-B1CA-46B6-AFD3-6C5F031BA9F5}" type="datetime1">
               <a:rPr lang="es-ES" smtClean="0"/>
-              <a:t>22/05/2014</a:t>
+              <a:t>29/05/2014</a:t>
             </a:fld>
             <a:endParaRPr lang="es-ES"/>
           </a:p>
@@ -20540,7 +20030,7 @@
           <a:p>
             <a:fld id="{0B37C077-F060-464F-B32E-5A027CAA7EE5}" type="datetime1">
               <a:rPr lang="es-ES" smtClean="0"/>
-              <a:t>22/05/2014</a:t>
+              <a:t>29/05/2014</a:t>
             </a:fld>
             <a:endParaRPr lang="es-ES"/>
           </a:p>
@@ -20727,7 +20217,7 @@
           <a:p>
             <a:fld id="{044796D8-2CFE-424D-95B5-C02F117F4DA7}" type="datetime1">
               <a:rPr lang="es-ES" smtClean="0"/>
-              <a:t>22/05/2014</a:t>
+              <a:t>29/05/2014</a:t>
             </a:fld>
             <a:endParaRPr lang="es-ES"/>
           </a:p>
@@ -20953,7 +20443,7 @@
           <a:p>
             <a:fld id="{C6301DF5-4C32-4FD2-9F1E-7803347A8368}" type="datetime1">
               <a:rPr lang="es-ES" smtClean="0"/>
-              <a:t>22/05/2014</a:t>
+              <a:t>29/05/2014</a:t>
             </a:fld>
             <a:endParaRPr lang="es-ES"/>
           </a:p>
@@ -21245,7 +20735,7 @@
           <a:p>
             <a:fld id="{8F4C3E1B-E0F3-413D-8C72-2BCF77A3DFE3}" type="datetime1">
               <a:rPr lang="es-ES" smtClean="0"/>
-              <a:t>22/05/2014</a:t>
+              <a:t>29/05/2014</a:t>
             </a:fld>
             <a:endParaRPr lang="es-ES"/>
           </a:p>
@@ -21623,7 +21113,7 @@
           <a:p>
             <a:fld id="{F1FE8424-974D-49C6-BF35-FA4785DADBBB}" type="datetime1">
               <a:rPr lang="es-ES" smtClean="0"/>
-              <a:t>22/05/2014</a:t>
+              <a:t>29/05/2014</a:t>
             </a:fld>
             <a:endParaRPr lang="es-ES"/>
           </a:p>
@@ -23162,7 +22652,7 @@
           <a:p>
             <a:fld id="{70B1507C-A8D8-4D47-A58E-ED01E3345AC0}" type="datetime1">
               <a:rPr lang="es-ES" smtClean="0"/>
-              <a:t>22/05/2014</a:t>
+              <a:t>29/05/2014</a:t>
             </a:fld>
             <a:endParaRPr lang="es-ES" dirty="0"/>
           </a:p>
@@ -25012,7 +24502,7 @@
           <a:p>
             <a:fld id="{013DBFBD-FEB9-4E9A-A228-9A84DDF78783}" type="datetime1">
               <a:rPr lang="es-ES" smtClean="0"/>
-              <a:t>22/05/2014</a:t>
+              <a:t>29/05/2014</a:t>
             </a:fld>
             <a:endParaRPr lang="es-ES"/>
           </a:p>
@@ -25392,7 +24882,7 @@
           <a:p>
             <a:fld id="{89F5032E-2175-444E-9EC8-0A131EA1CD7F}" type="datetime1">
               <a:rPr lang="es-ES" smtClean="0"/>
-              <a:t>22/05/2014</a:t>
+              <a:t>29/05/2014</a:t>
             </a:fld>
             <a:endParaRPr lang="es-ES"/>
           </a:p>
@@ -26719,7 +26209,7 @@
           <a:p>
             <a:fld id="{22B5F016-6FD1-449E-B0CD-6DE259AD8B4D}" type="datetime1">
               <a:rPr lang="es-ES" smtClean="0"/>
-              <a:t>22/05/2014</a:t>
+              <a:t>29/05/2014</a:t>
             </a:fld>
             <a:endParaRPr lang="es-ES"/>
           </a:p>
@@ -27190,7 +26680,7 @@
           <a:p>
             <a:fld id="{763B8448-EE42-420E-9C52-AC755E0C7F00}" type="datetime1">
               <a:rPr lang="es-ES" smtClean="0"/>
-              <a:t>22/05/2014</a:t>
+              <a:t>29/05/2014</a:t>
             </a:fld>
             <a:endParaRPr lang="es-ES"/>
           </a:p>
@@ -27999,7 +27489,7 @@
           <a:p>
             <a:fld id="{8E3BCEFF-812D-4B55-9628-294AB5A6F171}" type="datetime1">
               <a:rPr lang="es-ES" smtClean="0"/>
-              <a:t>22/05/2014</a:t>
+              <a:t>29/05/2014</a:t>
             </a:fld>
             <a:endParaRPr lang="es-ES"/>
           </a:p>
@@ -28296,7 +27786,7 @@
           <a:p>
             <a:fld id="{973877CB-F549-4229-BBFA-B951CA674B98}" type="datetime1">
               <a:rPr lang="es-ES" smtClean="0"/>
-              <a:t>22/05/2014</a:t>
+              <a:t>29/05/2014</a:t>
             </a:fld>
             <a:endParaRPr lang="es-ES"/>
           </a:p>
@@ -28596,7 +28086,7 @@
           <a:p>
             <a:fld id="{0F0EC6FB-8467-4740-A5E4-D12619A04D43}" type="datetime1">
               <a:rPr lang="es-ES" smtClean="0"/>
-              <a:t>22/05/2014</a:t>
+              <a:t>29/05/2014</a:t>
             </a:fld>
             <a:endParaRPr lang="es-ES"/>
           </a:p>
@@ -28950,7 +28440,7 @@
           <a:p>
             <a:fld id="{187CEC56-DEDA-4435-8A63-BA8138C61B37}" type="datetime1">
               <a:rPr lang="es-ES" smtClean="0"/>
-              <a:t>22/05/2014</a:t>
+              <a:t>29/05/2014</a:t>
             </a:fld>
             <a:endParaRPr lang="es-ES"/>
           </a:p>
@@ -29831,7 +29321,7 @@
           <a:p>
             <a:fld id="{D427DFA0-97FA-4314-96B0-77899F4E7289}" type="datetime1">
               <a:rPr lang="es-ES" smtClean="0"/>
-              <a:t>22/05/2014</a:t>
+              <a:t>29/05/2014</a:t>
             </a:fld>
             <a:endParaRPr lang="es-ES"/>
           </a:p>
@@ -30037,7 +29527,7 @@
           <a:p>
             <a:fld id="{89F5032E-2175-444E-9EC8-0A131EA1CD7F}" type="datetime1">
               <a:rPr lang="es-ES" smtClean="0"/>
-              <a:t>22/05/2014</a:t>
+              <a:t>29/05/2014</a:t>
             </a:fld>
             <a:endParaRPr lang="es-ES"/>
           </a:p>
@@ -30582,7 +30072,7 @@
           <a:p>
             <a:fld id="{3FAA51DB-FA91-4C0A-B79D-18B45298E8CA}" type="datetime1">
               <a:rPr lang="es-ES" smtClean="0"/>
-              <a:t>22/05/2014</a:t>
+              <a:t>29/05/2014</a:t>
             </a:fld>
             <a:endParaRPr lang="es-ES"/>
           </a:p>
@@ -31379,7 +30869,7 @@
           <a:p>
             <a:fld id="{85477CEF-9598-40E8-B312-48CE66393D8D}" type="datetime1">
               <a:rPr lang="es-ES" smtClean="0"/>
-              <a:t>22/05/2014</a:t>
+              <a:t>29/05/2014</a:t>
             </a:fld>
             <a:endParaRPr lang="es-ES"/>
           </a:p>
@@ -31709,7 +31199,7 @@
           <a:p>
             <a:fld id="{4406A4E3-0EC5-4FE6-BE7A-8ED97DF17B78}" type="datetime1">
               <a:rPr lang="es-ES" smtClean="0"/>
-              <a:t>22/05/2014</a:t>
+              <a:t>29/05/2014</a:t>
             </a:fld>
             <a:endParaRPr lang="es-ES"/>
           </a:p>
@@ -31858,7 +31348,7 @@
           <a:p>
             <a:fld id="{72798095-643B-4C93-84BD-B9E6EC8BEBF9}" type="datetime1">
               <a:rPr lang="es-ES" smtClean="0"/>
-              <a:t>22/05/2014</a:t>
+              <a:t>29/05/2014</a:t>
             </a:fld>
             <a:endParaRPr lang="es-ES"/>
           </a:p>
@@ -32900,7 +32390,7 @@
           <a:p>
             <a:fld id="{F4BB1F6D-26D8-4664-8E17-041100011E7C}" type="datetime1">
               <a:rPr lang="es-ES" smtClean="0"/>
-              <a:t>22/05/2014</a:t>
+              <a:t>29/05/2014</a:t>
             </a:fld>
             <a:endParaRPr lang="es-ES"/>
           </a:p>
@@ -33792,7 +33282,7 @@
           <a:p>
             <a:fld id="{476FF51F-7909-449E-A334-B8C1CF5611E8}" type="datetime1">
               <a:rPr lang="es-ES" smtClean="0"/>
-              <a:t>22/05/2014</a:t>
+              <a:t>29/05/2014</a:t>
             </a:fld>
             <a:endParaRPr lang="es-ES"/>
           </a:p>
@@ -34354,7 +33844,7 @@
           <a:p>
             <a:fld id="{A24266F2-72CE-4E70-A95F-B6B4FA69A8CF}" type="datetime1">
               <a:rPr lang="es-ES" smtClean="0"/>
-              <a:t>22/05/2014</a:t>
+              <a:t>29/05/2014</a:t>
             </a:fld>
             <a:endParaRPr lang="es-ES"/>
           </a:p>
@@ -34647,7 +34137,7 @@
           <a:p>
             <a:fld id="{97B530F5-8F85-4113-A82C-4B5DDFB23253}" type="datetime1">
               <a:rPr lang="es-ES" smtClean="0"/>
-              <a:t>22/05/2014</a:t>
+              <a:t>29/05/2014</a:t>
             </a:fld>
             <a:endParaRPr lang="es-ES"/>
           </a:p>
@@ -34927,7 +34417,7 @@
           <a:p>
             <a:fld id="{530F61FA-93A3-4291-A519-E372CF4F1CB4}" type="datetime1">
               <a:rPr lang="es-ES" smtClean="0"/>
-              <a:t>22/05/2014</a:t>
+              <a:t>29/05/2014</a:t>
             </a:fld>
             <a:endParaRPr lang="es-ES"/>
           </a:p>
@@ -35378,7 +34868,7 @@
           <a:p>
             <a:fld id="{35F42560-1722-48FE-9601-C7219FF11EAB}" type="datetime1">
               <a:rPr lang="es-ES" smtClean="0"/>
-              <a:t>22/05/2014</a:t>
+              <a:t>29/05/2014</a:t>
             </a:fld>
             <a:endParaRPr lang="es-ES"/>
           </a:p>
@@ -35538,7 +35028,7 @@
           <a:p>
             <a:fld id="{89F5032E-2175-444E-9EC8-0A131EA1CD7F}" type="datetime1">
               <a:rPr lang="es-ES" smtClean="0"/>
-              <a:t>22/05/2014</a:t>
+              <a:t>29/05/2014</a:t>
             </a:fld>
             <a:endParaRPr lang="es-ES"/>
           </a:p>
@@ -35688,30 +35178,17 @@
         <p:spPr/>
         <p:txBody>
           <a:bodyPr>
-            <a:normAutofit fontScale="92500" lnSpcReduction="10000"/>
+            <a:normAutofit/>
           </a:bodyPr>
           <a:lstStyle/>
           <a:p>
             <a:r>
               <a:rPr lang="es-AR" dirty="0" smtClean="0"/>
-              <a:t>Crear los modelos – Basado en base de Datos (LINQ </a:t>
-            </a:r>
-            <a:r>
-              <a:rPr lang="es-AR" dirty="0" err="1" smtClean="0"/>
-              <a:t>to</a:t>
+              <a:t>Crear </a:t>
             </a:r>
             <a:r>
               <a:rPr lang="es-AR" dirty="0" smtClean="0"/>
-              <a:t> SQL)</a:t>
-            </a:r>
-          </a:p>
-          <a:p>
-            <a:endParaRPr lang="es-AR" dirty="0"/>
-          </a:p>
-          <a:p>
-            <a:r>
-              <a:rPr lang="es-AR" dirty="0" smtClean="0"/>
-              <a:t>Crear el patrón repositorio (CRUD)</a:t>
+              <a:t>el patrón repositorio (CRUD)</a:t>
             </a:r>
           </a:p>
           <a:p>
@@ -35722,64 +35199,6 @@
               <a:rPr lang="es-AR" dirty="0" smtClean="0"/>
               <a:t>Crear el Controlador de la Entidad</a:t>
             </a:r>
-          </a:p>
-          <a:p>
-            <a:pPr lvl="1"/>
-            <a:r>
-              <a:rPr lang="es-AR" dirty="0" smtClean="0"/>
-              <a:t>Definir la Acción de Listar</a:t>
-            </a:r>
-          </a:p>
-          <a:p>
-            <a:pPr lvl="1"/>
-            <a:r>
-              <a:rPr lang="es-AR" dirty="0" smtClean="0"/>
-              <a:t>Crear la Vista de Lista de la Entidad</a:t>
-            </a:r>
-          </a:p>
-          <a:p>
-            <a:pPr lvl="1"/>
-            <a:r>
-              <a:rPr lang="es-AR" dirty="0" smtClean="0"/>
-              <a:t>Definir la Acción de Crear</a:t>
-            </a:r>
-          </a:p>
-          <a:p>
-            <a:pPr lvl="1"/>
-            <a:r>
-              <a:rPr lang="es-AR" dirty="0" smtClean="0"/>
-              <a:t>Crear la Vista de Crear</a:t>
-            </a:r>
-          </a:p>
-          <a:p>
-            <a:pPr lvl="1"/>
-            <a:r>
-              <a:rPr lang="es-AR" dirty="0" smtClean="0"/>
-              <a:t>Definir la Acción de Editar</a:t>
-            </a:r>
-          </a:p>
-          <a:p>
-            <a:pPr lvl="1"/>
-            <a:r>
-              <a:rPr lang="es-AR" dirty="0"/>
-              <a:t>Crear la Vista de </a:t>
-            </a:r>
-            <a:r>
-              <a:rPr lang="es-AR" dirty="0" smtClean="0"/>
-              <a:t>Editar</a:t>
-            </a:r>
-          </a:p>
-          <a:p>
-            <a:pPr lvl="1"/>
-            <a:r>
-              <a:rPr lang="es-AR" dirty="0"/>
-              <a:t>Definir la Acción de </a:t>
-            </a:r>
-            <a:r>
-              <a:rPr lang="es-AR" dirty="0" smtClean="0"/>
-              <a:t>Eliminar</a:t>
-            </a:r>
-            <a:endParaRPr lang="es-AR" dirty="0"/>
           </a:p>
           <a:p>
             <a:pPr lvl="1"/>
@@ -35840,7 +35259,7 @@
           <a:p>
             <a:fld id="{D1557E3E-B3D6-48C1-8CA1-EEF126B2EEE0}" type="datetime1">
               <a:rPr lang="es-ES" smtClean="0"/>
-              <a:t>22/05/2014</a:t>
+              <a:t>29/05/2014</a:t>
             </a:fld>
             <a:endParaRPr lang="es-ES"/>
           </a:p>
@@ -35932,1315 +35351,6 @@
       </p:grpSpPr>
       <p:sp>
         <p:nvSpPr>
-          <p:cNvPr id="2" name="1 Título"/>
-          <p:cNvSpPr>
-            <a:spLocks noGrp="1"/>
-          </p:cNvSpPr>
-          <p:nvPr>
-            <p:ph type="title"/>
-          </p:nvPr>
-        </p:nvSpPr>
-        <p:spPr/>
-        <p:txBody>
-          <a:bodyPr/>
-          <a:lstStyle/>
-          <a:p>
-            <a:r>
-              <a:rPr lang="es-AR" dirty="0" smtClean="0"/>
-              <a:t>Aplicaciones </a:t>
-            </a:r>
-            <a:r>
-              <a:rPr lang="es-AR" dirty="0" err="1" smtClean="0"/>
-              <a:t>Silverligth</a:t>
-            </a:r>
-            <a:endParaRPr lang="es-AR" dirty="0"/>
-          </a:p>
-        </p:txBody>
-      </p:sp>
-      <p:sp>
-        <p:nvSpPr>
-          <p:cNvPr id="3" name="2 Marcador de texto"/>
-          <p:cNvSpPr>
-            <a:spLocks noGrp="1"/>
-          </p:cNvSpPr>
-          <p:nvPr>
-            <p:ph type="body" idx="1"/>
-          </p:nvPr>
-        </p:nvSpPr>
-        <p:spPr/>
-        <p:txBody>
-          <a:bodyPr/>
-          <a:lstStyle/>
-          <a:p>
-            <a:endParaRPr lang="es-AR" dirty="0"/>
-          </a:p>
-        </p:txBody>
-      </p:sp>
-      <p:sp>
-        <p:nvSpPr>
-          <p:cNvPr id="4" name="3 Marcador de fecha"/>
-          <p:cNvSpPr>
-            <a:spLocks noGrp="1"/>
-          </p:cNvSpPr>
-          <p:nvPr>
-            <p:ph type="dt" sz="half" idx="10"/>
-          </p:nvPr>
-        </p:nvSpPr>
-        <p:spPr/>
-        <p:txBody>
-          <a:bodyPr/>
-          <a:lstStyle/>
-          <a:p>
-            <a:fld id="{FE605258-EEED-46C5-8903-0C9F868299C6}" type="datetime1">
-              <a:rPr lang="es-ES" smtClean="0"/>
-              <a:t>22/05/2014</a:t>
-            </a:fld>
-            <a:endParaRPr lang="es-ES"/>
-          </a:p>
-        </p:txBody>
-      </p:sp>
-      <p:sp>
-        <p:nvSpPr>
-          <p:cNvPr id="5" name="4 Marcador de pie de página"/>
-          <p:cNvSpPr>
-            <a:spLocks noGrp="1"/>
-          </p:cNvSpPr>
-          <p:nvPr>
-            <p:ph type="ftr" sz="quarter" idx="11"/>
-          </p:nvPr>
-        </p:nvSpPr>
-        <p:spPr/>
-        <p:txBody>
-          <a:bodyPr/>
-          <a:lstStyle/>
-          <a:p>
-            <a:r>
-              <a:rPr lang="es-AR" smtClean="0"/>
-              <a:t>Introducción a la Plataforma .NET – Capa de Presentacion</a:t>
-            </a:r>
-            <a:endParaRPr lang="es-ES"/>
-          </a:p>
-        </p:txBody>
-      </p:sp>
-      <p:sp>
-        <p:nvSpPr>
-          <p:cNvPr id="6" name="5 Marcador de número de diapositiva"/>
-          <p:cNvSpPr>
-            <a:spLocks noGrp="1"/>
-          </p:cNvSpPr>
-          <p:nvPr>
-            <p:ph type="sldNum" sz="quarter" idx="12"/>
-          </p:nvPr>
-        </p:nvSpPr>
-        <p:spPr/>
-        <p:txBody>
-          <a:bodyPr/>
-          <a:lstStyle/>
-          <a:p>
-            <a:fld id="{132FADFE-3B8F-471C-ABF0-DBC7717ECBBC}" type="slidenum">
-              <a:rPr lang="es-ES" smtClean="0"/>
-              <a:pPr/>
-              <a:t>41</a:t>
-            </a:fld>
-            <a:endParaRPr lang="es-ES"/>
-          </a:p>
-        </p:txBody>
-      </p:sp>
-    </p:spTree>
-    <p:extLst>
-      <p:ext uri="{BB962C8B-B14F-4D97-AF65-F5344CB8AC3E}">
-        <p14:creationId xmlns:p14="http://schemas.microsoft.com/office/powerpoint/2010/main" val="2382362357"/>
-      </p:ext>
-    </p:extLst>
-  </p:cSld>
-  <p:clrMapOvr>
-    <a:masterClrMapping/>
-  </p:clrMapOvr>
-  <p:timing>
-    <p:tnLst>
-      <p:par>
-        <p:cTn id="1" dur="indefinite" restart="never" nodeType="tmRoot"/>
-      </p:par>
-    </p:tnLst>
-  </p:timing>
-</p:sld>
-</file>
-
-<file path=ppt/slides/slide42.xml><?xml version="1.0" encoding="utf-8"?>
-<p:sld xmlns:a="http://schemas.openxmlformats.org/drawingml/2006/main" xmlns:r="http://schemas.openxmlformats.org/officeDocument/2006/relationships" xmlns:p="http://schemas.openxmlformats.org/presentationml/2006/main">
-  <p:cSld>
-    <p:spTree>
-      <p:nvGrpSpPr>
-        <p:cNvPr id="1" name=""/>
-        <p:cNvGrpSpPr/>
-        <p:nvPr/>
-      </p:nvGrpSpPr>
-      <p:grpSpPr>
-        <a:xfrm>
-          <a:off x="0" y="0"/>
-          <a:ext cx="0" cy="0"/>
-          <a:chOff x="0" y="0"/>
-          <a:chExt cx="0" cy="0"/>
-        </a:xfrm>
-      </p:grpSpPr>
-      <p:sp>
-        <p:nvSpPr>
-          <p:cNvPr id="2" name="1 Título"/>
-          <p:cNvSpPr>
-            <a:spLocks noGrp="1"/>
-          </p:cNvSpPr>
-          <p:nvPr>
-            <p:ph type="title"/>
-          </p:nvPr>
-        </p:nvSpPr>
-        <p:spPr/>
-        <p:txBody>
-          <a:bodyPr/>
-          <a:lstStyle/>
-          <a:p>
-            <a:r>
-              <a:rPr lang="es-AR" dirty="0" smtClean="0"/>
-              <a:t>¿Qué es </a:t>
-            </a:r>
-            <a:r>
-              <a:rPr lang="es-AR" dirty="0" err="1" smtClean="0"/>
-              <a:t>Silverligth</a:t>
-            </a:r>
-            <a:r>
-              <a:rPr lang="es-AR" dirty="0" smtClean="0"/>
-              <a:t>?</a:t>
-            </a:r>
-            <a:endParaRPr lang="es-AR" dirty="0"/>
-          </a:p>
-        </p:txBody>
-      </p:sp>
-      <p:sp>
-        <p:nvSpPr>
-          <p:cNvPr id="3" name="2 Marcador de contenido"/>
-          <p:cNvSpPr>
-            <a:spLocks noGrp="1"/>
-          </p:cNvSpPr>
-          <p:nvPr>
-            <p:ph sz="quarter" idx="13"/>
-          </p:nvPr>
-        </p:nvSpPr>
-        <p:spPr/>
-        <p:txBody>
-          <a:bodyPr/>
-          <a:lstStyle/>
-          <a:p>
-            <a:r>
-              <a:rPr lang="es-AR" dirty="0" smtClean="0"/>
-              <a:t>Es tecnología web.</a:t>
-            </a:r>
-          </a:p>
-          <a:p>
-            <a:endParaRPr lang="es-AR" dirty="0"/>
-          </a:p>
-          <a:p>
-            <a:r>
-              <a:rPr lang="es-AR" dirty="0" smtClean="0"/>
-              <a:t>Son para aplicaciones de interfaz de usuario ricas.</a:t>
-            </a:r>
-          </a:p>
-          <a:p>
-            <a:endParaRPr lang="es-AR" dirty="0"/>
-          </a:p>
-          <a:p>
-            <a:r>
-              <a:rPr lang="es-AR" dirty="0" smtClean="0"/>
-              <a:t>Mismo modelo de desarrollo que WPF (usa XAML) pero corre en paginas web ASP.NET</a:t>
-            </a:r>
-            <a:endParaRPr lang="es-AR" dirty="0"/>
-          </a:p>
-        </p:txBody>
-      </p:sp>
-      <p:pic>
-        <p:nvPicPr>
-          <p:cNvPr id="1026" name="Picture 2" descr="http://3.bp.blogspot.com/_UqdzOP9BTGo/S8Q1M2odfiI/AAAAAAAAAJA/W6EMvuQvqUc/s1600/microsoft_silverlight_c.jpg"/>
-          <p:cNvPicPr>
-            <a:picLocks noChangeAspect="1" noChangeArrowheads="1"/>
-          </p:cNvPicPr>
-          <p:nvPr/>
-        </p:nvPicPr>
-        <p:blipFill>
-          <a:blip r:embed="rId3">
-            <a:extLst>
-              <a:ext uri="{28A0092B-C50C-407E-A947-70E740481C1C}">
-                <a14:useLocalDpi xmlns:a14="http://schemas.microsoft.com/office/drawing/2010/main" val="0"/>
-              </a:ext>
-            </a:extLst>
-          </a:blip>
-          <a:srcRect/>
-          <a:stretch>
-            <a:fillRect/>
-          </a:stretch>
-        </p:blipFill>
-        <p:spPr bwMode="auto">
-          <a:xfrm>
-            <a:off x="5508104" y="1628800"/>
-            <a:ext cx="1909135" cy="2127323"/>
-          </a:xfrm>
-          <a:prstGeom prst="rect">
-            <a:avLst/>
-          </a:prstGeom>
-          <a:noFill/>
-          <a:extLst>
-            <a:ext uri="{909E8E84-426E-40DD-AFC4-6F175D3DCCD1}">
-              <a14:hiddenFill xmlns:a14="http://schemas.microsoft.com/office/drawing/2010/main">
-                <a:solidFill>
-                  <a:srgbClr val="FFFFFF"/>
-                </a:solidFill>
-              </a14:hiddenFill>
-            </a:ext>
-          </a:extLst>
-        </p:spPr>
-      </p:pic>
-      <p:pic>
-        <p:nvPicPr>
-          <p:cNvPr id="1028" name="Picture 4" descr="http://www.zervidesk.com/images/RIAs-technology.png"/>
-          <p:cNvPicPr>
-            <a:picLocks noChangeAspect="1" noChangeArrowheads="1"/>
-          </p:cNvPicPr>
-          <p:nvPr/>
-        </p:nvPicPr>
-        <p:blipFill>
-          <a:blip r:embed="rId4">
-            <a:extLst>
-              <a:ext uri="{28A0092B-C50C-407E-A947-70E740481C1C}">
-                <a14:useLocalDpi xmlns:a14="http://schemas.microsoft.com/office/drawing/2010/main" val="0"/>
-              </a:ext>
-            </a:extLst>
-          </a:blip>
-          <a:srcRect/>
-          <a:stretch>
-            <a:fillRect/>
-          </a:stretch>
-        </p:blipFill>
-        <p:spPr bwMode="auto">
-          <a:xfrm>
-            <a:off x="5220072" y="4044155"/>
-            <a:ext cx="2749856" cy="2327921"/>
-          </a:xfrm>
-          <a:prstGeom prst="rect">
-            <a:avLst/>
-          </a:prstGeom>
-          <a:noFill/>
-          <a:extLst>
-            <a:ext uri="{909E8E84-426E-40DD-AFC4-6F175D3DCCD1}">
-              <a14:hiddenFill xmlns:a14="http://schemas.microsoft.com/office/drawing/2010/main">
-                <a:solidFill>
-                  <a:srgbClr val="FFFFFF"/>
-                </a:solidFill>
-              </a14:hiddenFill>
-            </a:ext>
-          </a:extLst>
-        </p:spPr>
-      </p:pic>
-      <p:sp>
-        <p:nvSpPr>
-          <p:cNvPr id="5" name="4 Marcador de fecha"/>
-          <p:cNvSpPr>
-            <a:spLocks noGrp="1"/>
-          </p:cNvSpPr>
-          <p:nvPr>
-            <p:ph type="dt" sz="half" idx="10"/>
-          </p:nvPr>
-        </p:nvSpPr>
-        <p:spPr/>
-        <p:txBody>
-          <a:bodyPr/>
-          <a:lstStyle/>
-          <a:p>
-            <a:fld id="{B835C591-B314-43FB-A320-60F09CAE6C5B}" type="datetime1">
-              <a:rPr lang="es-ES" smtClean="0"/>
-              <a:t>22/05/2014</a:t>
-            </a:fld>
-            <a:endParaRPr lang="es-ES"/>
-          </a:p>
-        </p:txBody>
-      </p:sp>
-      <p:sp>
-        <p:nvSpPr>
-          <p:cNvPr id="6" name="5 Marcador de pie de página"/>
-          <p:cNvSpPr>
-            <a:spLocks noGrp="1"/>
-          </p:cNvSpPr>
-          <p:nvPr>
-            <p:ph type="ftr" sz="quarter" idx="11"/>
-          </p:nvPr>
-        </p:nvSpPr>
-        <p:spPr/>
-        <p:txBody>
-          <a:bodyPr/>
-          <a:lstStyle/>
-          <a:p>
-            <a:r>
-              <a:rPr lang="es-AR" smtClean="0"/>
-              <a:t>Introducción a la Plataforma .NET – Capa de Presentacion</a:t>
-            </a:r>
-            <a:endParaRPr lang="es-ES"/>
-          </a:p>
-        </p:txBody>
-      </p:sp>
-      <p:sp>
-        <p:nvSpPr>
-          <p:cNvPr id="7" name="6 Marcador de número de diapositiva"/>
-          <p:cNvSpPr>
-            <a:spLocks noGrp="1"/>
-          </p:cNvSpPr>
-          <p:nvPr>
-            <p:ph type="sldNum" sz="quarter" idx="12"/>
-          </p:nvPr>
-        </p:nvSpPr>
-        <p:spPr/>
-        <p:txBody>
-          <a:bodyPr/>
-          <a:lstStyle/>
-          <a:p>
-            <a:fld id="{132FADFE-3B8F-471C-ABF0-DBC7717ECBBC}" type="slidenum">
-              <a:rPr lang="es-ES" smtClean="0"/>
-              <a:pPr/>
-              <a:t>42</a:t>
-            </a:fld>
-            <a:endParaRPr lang="es-ES"/>
-          </a:p>
-        </p:txBody>
-      </p:sp>
-    </p:spTree>
-    <p:extLst>
-      <p:ext uri="{BB962C8B-B14F-4D97-AF65-F5344CB8AC3E}">
-        <p14:creationId xmlns:p14="http://schemas.microsoft.com/office/powerpoint/2010/main" val="2686193950"/>
-      </p:ext>
-    </p:extLst>
-  </p:cSld>
-  <p:clrMapOvr>
-    <a:masterClrMapping/>
-  </p:clrMapOvr>
-  <p:timing>
-    <p:tnLst>
-      <p:par>
-        <p:cTn id="1" dur="indefinite" restart="never" nodeType="tmRoot"/>
-      </p:par>
-    </p:tnLst>
-  </p:timing>
-</p:sld>
-</file>
-
-<file path=ppt/slides/slide43.xml><?xml version="1.0" encoding="utf-8"?>
-<p:sld xmlns:a="http://schemas.openxmlformats.org/drawingml/2006/main" xmlns:r="http://schemas.openxmlformats.org/officeDocument/2006/relationships" xmlns:p="http://schemas.openxmlformats.org/presentationml/2006/main">
-  <p:cSld>
-    <p:spTree>
-      <p:nvGrpSpPr>
-        <p:cNvPr id="1" name=""/>
-        <p:cNvGrpSpPr/>
-        <p:nvPr/>
-      </p:nvGrpSpPr>
-      <p:grpSpPr>
-        <a:xfrm>
-          <a:off x="0" y="0"/>
-          <a:ext cx="0" cy="0"/>
-          <a:chOff x="0" y="0"/>
-          <a:chExt cx="0" cy="0"/>
-        </a:xfrm>
-      </p:grpSpPr>
-      <p:sp>
-        <p:nvSpPr>
-          <p:cNvPr id="2" name="1 Título"/>
-          <p:cNvSpPr>
-            <a:spLocks noGrp="1"/>
-          </p:cNvSpPr>
-          <p:nvPr>
-            <p:ph type="title"/>
-          </p:nvPr>
-        </p:nvSpPr>
-        <p:spPr/>
-        <p:txBody>
-          <a:bodyPr/>
-          <a:lstStyle/>
-          <a:p>
-            <a:r>
-              <a:rPr lang="es-AR" dirty="0" err="1" smtClean="0"/>
-              <a:t>Silverligth</a:t>
-            </a:r>
-            <a:r>
-              <a:rPr lang="es-AR" dirty="0" smtClean="0"/>
-              <a:t> vs WPF</a:t>
-            </a:r>
-            <a:endParaRPr lang="es-AR" dirty="0"/>
-          </a:p>
-        </p:txBody>
-      </p:sp>
-      <p:graphicFrame>
-        <p:nvGraphicFramePr>
-          <p:cNvPr id="5" name="4 Marcador de contenido"/>
-          <p:cNvGraphicFramePr>
-            <a:graphicFrameLocks noGrp="1"/>
-          </p:cNvGraphicFramePr>
-          <p:nvPr>
-            <p:ph sz="quarter" idx="13"/>
-            <p:extLst>
-              <p:ext uri="{D42A27DB-BD31-4B8C-83A1-F6EECF244321}">
-                <p14:modId xmlns:p14="http://schemas.microsoft.com/office/powerpoint/2010/main" val="984764636"/>
-              </p:ext>
-            </p:extLst>
-          </p:nvPr>
-        </p:nvGraphicFramePr>
-        <p:xfrm>
-          <a:off x="395536" y="2132856"/>
-          <a:ext cx="8352159" cy="4340526"/>
-        </p:xfrm>
-        <a:graphic>
-          <a:graphicData uri="http://schemas.openxmlformats.org/drawingml/2006/table">
-            <a:tbl>
-              <a:tblPr firstRow="1" bandRow="1">
-                <a:tableStyleId>{5C22544A-7EE6-4342-B048-85BDC9FD1C3A}</a:tableStyleId>
-              </a:tblPr>
-              <a:tblGrid>
-                <a:gridCol w="1439392"/>
-                <a:gridCol w="3312368"/>
-                <a:gridCol w="3600399"/>
-              </a:tblGrid>
-              <a:tr h="453548">
-                <a:tc>
-                  <a:txBody>
-                    <a:bodyPr/>
-                    <a:lstStyle/>
-                    <a:p>
-                      <a:pPr algn="ctr"/>
-                      <a:r>
-                        <a:rPr lang="es-AR" dirty="0" smtClean="0"/>
-                        <a:t>Aspecto</a:t>
-                      </a:r>
-                      <a:endParaRPr lang="es-AR" dirty="0"/>
-                    </a:p>
-                  </a:txBody>
-                  <a:tcPr/>
-                </a:tc>
-                <a:tc>
-                  <a:txBody>
-                    <a:bodyPr/>
-                    <a:lstStyle/>
-                    <a:p>
-                      <a:pPr algn="ctr"/>
-                      <a:r>
-                        <a:rPr lang="es-AR" dirty="0" err="1" smtClean="0"/>
-                        <a:t>Silverligth</a:t>
-                      </a:r>
-                      <a:endParaRPr lang="es-AR" dirty="0"/>
-                    </a:p>
-                  </a:txBody>
-                  <a:tcPr/>
-                </a:tc>
-                <a:tc>
-                  <a:txBody>
-                    <a:bodyPr/>
-                    <a:lstStyle/>
-                    <a:p>
-                      <a:pPr algn="ctr"/>
-                      <a:r>
-                        <a:rPr lang="es-AR" dirty="0" smtClean="0"/>
-                        <a:t>WPF</a:t>
-                      </a:r>
-                      <a:endParaRPr lang="es-AR" dirty="0"/>
-                    </a:p>
-                  </a:txBody>
-                  <a:tcPr/>
-                </a:tc>
-              </a:tr>
-              <a:tr h="495480">
-                <a:tc>
-                  <a:txBody>
-                    <a:bodyPr/>
-                    <a:lstStyle/>
-                    <a:p>
-                      <a:pPr algn="l"/>
-                      <a:r>
-                        <a:rPr lang="es-AR" dirty="0" smtClean="0"/>
-                        <a:t>Definición</a:t>
-                      </a:r>
-                      <a:endParaRPr lang="es-AR" dirty="0"/>
-                    </a:p>
-                  </a:txBody>
-                  <a:tcPr/>
-                </a:tc>
-                <a:tc>
-                  <a:txBody>
-                    <a:bodyPr/>
-                    <a:lstStyle/>
-                    <a:p>
-                      <a:r>
-                        <a:rPr lang="es-AR" sz="1400" b="0" i="0" kern="1200" dirty="0" smtClean="0">
-                          <a:solidFill>
-                            <a:schemeClr val="dk1"/>
-                          </a:solidFill>
-                          <a:effectLst/>
-                          <a:latin typeface="+mn-lt"/>
-                          <a:ea typeface="+mn-ea"/>
-                          <a:cs typeface="+mn-cs"/>
-                        </a:rPr>
-                        <a:t>Plataforma</a:t>
-                      </a:r>
-                      <a:r>
-                        <a:rPr lang="es-AR" sz="1400" b="0" i="0" kern="1200" baseline="0" dirty="0" smtClean="0">
-                          <a:solidFill>
-                            <a:schemeClr val="dk1"/>
-                          </a:solidFill>
-                          <a:effectLst/>
-                          <a:latin typeface="+mn-lt"/>
-                          <a:ea typeface="+mn-ea"/>
-                          <a:cs typeface="+mn-cs"/>
-                        </a:rPr>
-                        <a:t> de </a:t>
-                      </a:r>
-                      <a:r>
-                        <a:rPr lang="es-AR" sz="1400" b="0" i="0" kern="1200" dirty="0" smtClean="0">
-                          <a:solidFill>
-                            <a:schemeClr val="dk1"/>
-                          </a:solidFill>
-                          <a:effectLst/>
-                          <a:latin typeface="+mn-lt"/>
-                          <a:ea typeface="+mn-ea"/>
-                          <a:cs typeface="+mn-cs"/>
-                        </a:rPr>
-                        <a:t>desarrollo para la construcción de aplicaciones cliente Web</a:t>
-                      </a:r>
-                      <a:endParaRPr lang="es-AR" sz="1400" dirty="0"/>
-                    </a:p>
-                  </a:txBody>
-                  <a:tcPr/>
-                </a:tc>
-                <a:tc>
-                  <a:txBody>
-                    <a:bodyPr/>
-                    <a:lstStyle/>
-                    <a:p>
-                      <a:pPr marL="0" marR="0" indent="0" algn="l" defTabSz="914400" rtl="0" eaLnBrk="1" fontAlgn="auto" latinLnBrk="0" hangingPunct="1">
-                        <a:lnSpc>
-                          <a:spcPct val="100000"/>
-                        </a:lnSpc>
-                        <a:spcBef>
-                          <a:spcPts val="0"/>
-                        </a:spcBef>
-                        <a:spcAft>
-                          <a:spcPts val="0"/>
-                        </a:spcAft>
-                        <a:buClrTx/>
-                        <a:buSzTx/>
-                        <a:buFontTx/>
-                        <a:buNone/>
-                        <a:tabLst/>
-                        <a:defRPr/>
-                      </a:pPr>
-                      <a:r>
-                        <a:rPr lang="es-AR" sz="1400" b="0" i="0" kern="1200" dirty="0" smtClean="0">
-                          <a:solidFill>
-                            <a:schemeClr val="dk1"/>
-                          </a:solidFill>
-                          <a:effectLst/>
-                          <a:latin typeface="+mn-lt"/>
-                          <a:ea typeface="+mn-ea"/>
-                          <a:cs typeface="+mn-cs"/>
-                        </a:rPr>
-                        <a:t>Plataforma</a:t>
-                      </a:r>
-                      <a:r>
-                        <a:rPr lang="es-AR" sz="1400" b="0" i="0" kern="1200" baseline="0" dirty="0" smtClean="0">
-                          <a:solidFill>
-                            <a:schemeClr val="dk1"/>
-                          </a:solidFill>
-                          <a:effectLst/>
-                          <a:latin typeface="+mn-lt"/>
-                          <a:ea typeface="+mn-ea"/>
-                          <a:cs typeface="+mn-cs"/>
-                        </a:rPr>
-                        <a:t> de </a:t>
-                      </a:r>
-                      <a:r>
-                        <a:rPr lang="es-AR" sz="1400" b="0" i="0" kern="1200" dirty="0" smtClean="0">
-                          <a:solidFill>
-                            <a:schemeClr val="dk1"/>
-                          </a:solidFill>
-                          <a:effectLst/>
-                          <a:latin typeface="+mn-lt"/>
-                          <a:ea typeface="+mn-ea"/>
-                          <a:cs typeface="+mn-cs"/>
-                        </a:rPr>
-                        <a:t>desarrollo para la construcción de aplicaciones cliente Windows</a:t>
-                      </a:r>
-                      <a:endParaRPr lang="es-AR" sz="1400" dirty="0" smtClean="0"/>
-                    </a:p>
-                  </a:txBody>
-                  <a:tcPr/>
-                </a:tc>
-              </a:tr>
-              <a:tr h="903522">
-                <a:tc>
-                  <a:txBody>
-                    <a:bodyPr/>
-                    <a:lstStyle/>
-                    <a:p>
-                      <a:pPr algn="l"/>
-                      <a:r>
-                        <a:rPr lang="es-AR" dirty="0" smtClean="0"/>
-                        <a:t>Subconjunto de..</a:t>
-                      </a:r>
-                      <a:endParaRPr lang="es-AR" dirty="0"/>
-                    </a:p>
-                  </a:txBody>
-                  <a:tcPr/>
-                </a:tc>
-                <a:tc>
-                  <a:txBody>
-                    <a:bodyPr/>
-                    <a:lstStyle/>
-                    <a:p>
-                      <a:r>
-                        <a:rPr lang="es-AR" sz="1400" b="0" i="0" kern="1200" dirty="0" smtClean="0">
-                          <a:solidFill>
-                            <a:schemeClr val="dk1"/>
-                          </a:solidFill>
-                          <a:effectLst/>
-                          <a:latin typeface="+mn-lt"/>
-                          <a:ea typeface="+mn-ea"/>
-                          <a:cs typeface="+mn-cs"/>
-                        </a:rPr>
-                        <a:t>Considerado como un subconjunto de WPF,  tecnología basada en XAML que se ejecuta en dentro de un </a:t>
-                      </a:r>
-                      <a:r>
-                        <a:rPr lang="es-AR" sz="1400" b="0" i="0" kern="1200" dirty="0" err="1" smtClean="0">
-                          <a:solidFill>
-                            <a:schemeClr val="dk1"/>
-                          </a:solidFill>
-                          <a:effectLst/>
-                          <a:latin typeface="+mn-lt"/>
-                          <a:ea typeface="+mn-ea"/>
-                          <a:cs typeface="+mn-cs"/>
-                        </a:rPr>
-                        <a:t>plug</a:t>
-                      </a:r>
-                      <a:r>
-                        <a:rPr lang="es-AR" sz="1400" b="0" i="0" kern="1200" dirty="0" smtClean="0">
-                          <a:solidFill>
-                            <a:schemeClr val="dk1"/>
-                          </a:solidFill>
-                          <a:effectLst/>
-                          <a:latin typeface="+mn-lt"/>
-                          <a:ea typeface="+mn-ea"/>
-                          <a:cs typeface="+mn-cs"/>
-                        </a:rPr>
-                        <a:t>-in de un navegador </a:t>
-                      </a:r>
-                      <a:endParaRPr lang="es-AR" sz="1400" dirty="0"/>
-                    </a:p>
-                  </a:txBody>
-                  <a:tcPr/>
-                </a:tc>
-                <a:tc>
-                  <a:txBody>
-                    <a:bodyPr/>
-                    <a:lstStyle/>
-                    <a:p>
-                      <a:r>
-                        <a:rPr lang="es-AR" sz="1400" b="0" i="0" kern="1200" dirty="0" smtClean="0">
-                          <a:solidFill>
-                            <a:schemeClr val="dk1"/>
-                          </a:solidFill>
-                          <a:effectLst/>
-                          <a:latin typeface="+mn-lt"/>
-                          <a:ea typeface="+mn-ea"/>
-                          <a:cs typeface="+mn-cs"/>
-                        </a:rPr>
-                        <a:t>WPF está generalmente considerado como un subconjunto de. NET Framework, y es una tecnología basada en XAML</a:t>
-                      </a:r>
-                      <a:endParaRPr lang="es-AR" sz="1400" dirty="0"/>
-                    </a:p>
-                  </a:txBody>
-                  <a:tcPr/>
-                </a:tc>
-              </a:tr>
-              <a:tr h="378968">
-                <a:tc>
-                  <a:txBody>
-                    <a:bodyPr/>
-                    <a:lstStyle/>
-                    <a:p>
-                      <a:pPr algn="l"/>
-                      <a:r>
-                        <a:rPr lang="es-AR" dirty="0" smtClean="0"/>
-                        <a:t>GUI</a:t>
-                      </a:r>
-                      <a:endParaRPr lang="es-AR" dirty="0"/>
-                    </a:p>
-                  </a:txBody>
-                  <a:tcPr/>
-                </a:tc>
-                <a:tc>
-                  <a:txBody>
-                    <a:bodyPr/>
-                    <a:lstStyle/>
-                    <a:p>
-                      <a:pPr marL="0" marR="0" indent="0" algn="l" defTabSz="914400" rtl="0" eaLnBrk="1" fontAlgn="auto" latinLnBrk="0" hangingPunct="1">
-                        <a:lnSpc>
-                          <a:spcPct val="100000"/>
-                        </a:lnSpc>
-                        <a:spcBef>
-                          <a:spcPts val="0"/>
-                        </a:spcBef>
-                        <a:spcAft>
-                          <a:spcPts val="0"/>
-                        </a:spcAft>
-                        <a:buClrTx/>
-                        <a:buSzTx/>
-                        <a:buFontTx/>
-                        <a:buNone/>
-                        <a:tabLst/>
-                        <a:defRPr/>
-                      </a:pPr>
-                      <a:r>
-                        <a:rPr lang="es-AR" sz="1400" b="0" i="0" kern="1200" dirty="0" smtClean="0">
-                          <a:solidFill>
-                            <a:schemeClr val="dk1"/>
-                          </a:solidFill>
-                          <a:effectLst/>
-                          <a:latin typeface="+mn-lt"/>
-                          <a:ea typeface="+mn-ea"/>
-                          <a:cs typeface="+mn-cs"/>
-                        </a:rPr>
-                        <a:t>RIA (</a:t>
-                      </a:r>
-                      <a:r>
-                        <a:rPr lang="es-AR" sz="1400" b="0" i="0" kern="1200" dirty="0" err="1" smtClean="0">
-                          <a:solidFill>
-                            <a:schemeClr val="dk1"/>
-                          </a:solidFill>
-                          <a:effectLst/>
-                          <a:latin typeface="+mn-lt"/>
-                          <a:ea typeface="+mn-ea"/>
-                          <a:cs typeface="+mn-cs"/>
-                        </a:rPr>
-                        <a:t>Rich</a:t>
-                      </a:r>
-                      <a:r>
-                        <a:rPr lang="es-AR" sz="1400" b="0" i="0" kern="1200" dirty="0" smtClean="0">
-                          <a:solidFill>
-                            <a:schemeClr val="dk1"/>
-                          </a:solidFill>
-                          <a:effectLst/>
-                          <a:latin typeface="+mn-lt"/>
-                          <a:ea typeface="+mn-ea"/>
-                          <a:cs typeface="+mn-cs"/>
-                        </a:rPr>
-                        <a:t> Internet </a:t>
-                      </a:r>
-                      <a:r>
-                        <a:rPr lang="es-AR" sz="1400" b="0" i="0" kern="1200" dirty="0" err="1" smtClean="0">
-                          <a:solidFill>
-                            <a:schemeClr val="dk1"/>
-                          </a:solidFill>
-                          <a:effectLst/>
-                          <a:latin typeface="+mn-lt"/>
-                          <a:ea typeface="+mn-ea"/>
-                          <a:cs typeface="+mn-cs"/>
-                        </a:rPr>
-                        <a:t>Applications</a:t>
-                      </a:r>
-                      <a:r>
-                        <a:rPr lang="es-AR" sz="1400" b="0" i="0" kern="1200" dirty="0" smtClean="0">
-                          <a:solidFill>
-                            <a:schemeClr val="dk1"/>
-                          </a:solidFill>
-                          <a:effectLst/>
-                          <a:latin typeface="+mn-lt"/>
-                          <a:ea typeface="+mn-ea"/>
-                          <a:cs typeface="+mn-cs"/>
-                        </a:rPr>
-                        <a:t>)</a:t>
-                      </a:r>
-                      <a:endParaRPr lang="es-AR" sz="1400" b="0" i="0" kern="1200" dirty="0">
-                        <a:solidFill>
-                          <a:schemeClr val="dk1"/>
-                        </a:solidFill>
-                        <a:effectLst/>
-                        <a:latin typeface="+mn-lt"/>
-                        <a:ea typeface="+mn-ea"/>
-                        <a:cs typeface="+mn-cs"/>
-                      </a:endParaRPr>
-                    </a:p>
-                  </a:txBody>
-                  <a:tcPr/>
-                </a:tc>
-                <a:tc>
-                  <a:txBody>
-                    <a:bodyPr/>
-                    <a:lstStyle/>
-                    <a:p>
-                      <a:pPr marL="0" marR="0" indent="0" algn="l" defTabSz="914400" rtl="0" eaLnBrk="1" fontAlgn="auto" latinLnBrk="0" hangingPunct="1">
-                        <a:lnSpc>
-                          <a:spcPct val="100000"/>
-                        </a:lnSpc>
-                        <a:spcBef>
-                          <a:spcPts val="0"/>
-                        </a:spcBef>
-                        <a:spcAft>
-                          <a:spcPts val="0"/>
-                        </a:spcAft>
-                        <a:buClrTx/>
-                        <a:buSzTx/>
-                        <a:buFontTx/>
-                        <a:buNone/>
-                        <a:tabLst/>
-                        <a:defRPr/>
-                      </a:pPr>
-                      <a:r>
-                        <a:rPr lang="es-AR" sz="1400" b="0" i="0" kern="1200" dirty="0" smtClean="0">
-                          <a:solidFill>
-                            <a:schemeClr val="dk1"/>
-                          </a:solidFill>
-                          <a:effectLst/>
-                          <a:latin typeface="+mn-lt"/>
-                          <a:ea typeface="+mn-ea"/>
-                          <a:cs typeface="+mn-cs"/>
-                        </a:rPr>
-                        <a:t>Interfaces Ricas para clientes </a:t>
-                      </a:r>
-                      <a:r>
-                        <a:rPr lang="es-AR" sz="1400" b="0" i="0" kern="1200" dirty="0" err="1" smtClean="0">
-                          <a:solidFill>
-                            <a:schemeClr val="dk1"/>
-                          </a:solidFill>
-                          <a:effectLst/>
-                          <a:latin typeface="+mn-lt"/>
-                          <a:ea typeface="+mn-ea"/>
-                          <a:cs typeface="+mn-cs"/>
-                        </a:rPr>
-                        <a:t>windows</a:t>
-                      </a:r>
-                      <a:endParaRPr lang="es-AR" sz="1400" b="0" i="0" kern="1200" dirty="0">
-                        <a:solidFill>
-                          <a:schemeClr val="dk1"/>
-                        </a:solidFill>
-                        <a:effectLst/>
-                        <a:latin typeface="+mn-lt"/>
-                        <a:ea typeface="+mn-ea"/>
-                        <a:cs typeface="+mn-cs"/>
-                      </a:endParaRPr>
-                    </a:p>
-                  </a:txBody>
-                  <a:tcPr/>
-                </a:tc>
-              </a:tr>
-              <a:tr h="612064">
-                <a:tc>
-                  <a:txBody>
-                    <a:bodyPr/>
-                    <a:lstStyle/>
-                    <a:p>
-                      <a:pPr algn="l"/>
-                      <a:r>
-                        <a:rPr lang="es-AR" dirty="0" smtClean="0"/>
-                        <a:t>Software Requerido</a:t>
-                      </a:r>
-                      <a:endParaRPr lang="es-AR" dirty="0"/>
-                    </a:p>
-                  </a:txBody>
-                  <a:tcPr/>
-                </a:tc>
-                <a:tc>
-                  <a:txBody>
-                    <a:bodyPr/>
-                    <a:lstStyle/>
-                    <a:p>
-                      <a:pPr marL="0" marR="0" indent="0" algn="l" defTabSz="914400" rtl="0" eaLnBrk="1" fontAlgn="auto" latinLnBrk="0" hangingPunct="1">
-                        <a:lnSpc>
-                          <a:spcPct val="100000"/>
-                        </a:lnSpc>
-                        <a:spcBef>
-                          <a:spcPts val="0"/>
-                        </a:spcBef>
-                        <a:spcAft>
-                          <a:spcPts val="0"/>
-                        </a:spcAft>
-                        <a:buClrTx/>
-                        <a:buSzTx/>
-                        <a:buFontTx/>
-                        <a:buNone/>
-                        <a:tabLst/>
-                        <a:defRPr/>
-                      </a:pPr>
-                      <a:r>
-                        <a:rPr lang="es-AR" sz="1400" b="0" i="0" kern="1200" dirty="0" smtClean="0">
-                          <a:solidFill>
-                            <a:schemeClr val="dk1"/>
-                          </a:solidFill>
-                          <a:effectLst/>
-                          <a:latin typeface="+mn-lt"/>
-                          <a:ea typeface="+mn-ea"/>
-                          <a:cs typeface="+mn-cs"/>
-                        </a:rPr>
-                        <a:t>Corre en navegadores, se necesita instalar </a:t>
-                      </a:r>
-                      <a:r>
-                        <a:rPr lang="es-AR" sz="1400" b="0" i="0" kern="1200" dirty="0" err="1" smtClean="0">
-                          <a:solidFill>
-                            <a:schemeClr val="dk1"/>
-                          </a:solidFill>
-                          <a:effectLst/>
-                          <a:latin typeface="+mn-lt"/>
-                          <a:ea typeface="+mn-ea"/>
-                          <a:cs typeface="+mn-cs"/>
-                        </a:rPr>
-                        <a:t>Silverligth</a:t>
-                      </a:r>
-                      <a:r>
-                        <a:rPr lang="es-AR" sz="1400" b="0" i="0" kern="1200" dirty="0" smtClean="0">
-                          <a:solidFill>
-                            <a:schemeClr val="dk1"/>
-                          </a:solidFill>
-                          <a:effectLst/>
-                          <a:latin typeface="+mn-lt"/>
-                          <a:ea typeface="+mn-ea"/>
-                          <a:cs typeface="+mn-cs"/>
-                        </a:rPr>
-                        <a:t> en el cliente</a:t>
-                      </a:r>
-                      <a:endParaRPr lang="es-AR" sz="1400" b="0" i="0" kern="1200" dirty="0">
-                        <a:solidFill>
-                          <a:schemeClr val="dk1"/>
-                        </a:solidFill>
-                        <a:effectLst/>
-                        <a:latin typeface="+mn-lt"/>
-                        <a:ea typeface="+mn-ea"/>
-                        <a:cs typeface="+mn-cs"/>
-                      </a:endParaRPr>
-                    </a:p>
-                  </a:txBody>
-                  <a:tcPr/>
-                </a:tc>
-                <a:tc>
-                  <a:txBody>
-                    <a:bodyPr/>
-                    <a:lstStyle/>
-                    <a:p>
-                      <a:pPr marL="0" marR="0" indent="0" algn="l" defTabSz="914400" rtl="0" eaLnBrk="1" fontAlgn="auto" latinLnBrk="0" hangingPunct="1">
-                        <a:lnSpc>
-                          <a:spcPct val="100000"/>
-                        </a:lnSpc>
-                        <a:spcBef>
-                          <a:spcPts val="0"/>
-                        </a:spcBef>
-                        <a:spcAft>
-                          <a:spcPts val="0"/>
-                        </a:spcAft>
-                        <a:buClrTx/>
-                        <a:buSzTx/>
-                        <a:buFontTx/>
-                        <a:buNone/>
-                        <a:tabLst/>
-                        <a:defRPr/>
-                      </a:pPr>
-                      <a:r>
-                        <a:rPr lang="es-AR" sz="1400" b="0" i="0" kern="1200" dirty="0" smtClean="0">
-                          <a:solidFill>
-                            <a:schemeClr val="dk1"/>
-                          </a:solidFill>
-                          <a:effectLst/>
-                          <a:latin typeface="+mn-lt"/>
-                          <a:ea typeface="+mn-ea"/>
-                          <a:cs typeface="+mn-cs"/>
-                        </a:rPr>
-                        <a:t>No es un </a:t>
-                      </a:r>
-                      <a:r>
-                        <a:rPr lang="es-AR" sz="1400" b="0" i="0" kern="1200" dirty="0" err="1" smtClean="0">
-                          <a:solidFill>
-                            <a:schemeClr val="dk1"/>
-                          </a:solidFill>
-                          <a:effectLst/>
-                          <a:latin typeface="+mn-lt"/>
-                          <a:ea typeface="+mn-ea"/>
-                          <a:cs typeface="+mn-cs"/>
-                        </a:rPr>
-                        <a:t>plug</a:t>
-                      </a:r>
-                      <a:r>
-                        <a:rPr lang="es-AR" sz="1400" b="0" i="0" kern="1200" dirty="0" smtClean="0">
-                          <a:solidFill>
-                            <a:schemeClr val="dk1"/>
-                          </a:solidFill>
-                          <a:effectLst/>
-                          <a:latin typeface="+mn-lt"/>
-                          <a:ea typeface="+mn-ea"/>
-                          <a:cs typeface="+mn-cs"/>
-                        </a:rPr>
-                        <a:t>-in, debe estar la aplicación completa en la máquina</a:t>
-                      </a:r>
-                      <a:endParaRPr lang="es-AR" sz="1400" b="0" i="0" kern="1200" dirty="0">
-                        <a:solidFill>
-                          <a:schemeClr val="dk1"/>
-                        </a:solidFill>
-                        <a:effectLst/>
-                        <a:latin typeface="+mn-lt"/>
-                        <a:ea typeface="+mn-ea"/>
-                        <a:cs typeface="+mn-cs"/>
-                      </a:endParaRPr>
-                    </a:p>
-                  </a:txBody>
-                  <a:tcPr/>
-                </a:tc>
-              </a:tr>
-              <a:tr h="702445">
-                <a:tc>
-                  <a:txBody>
-                    <a:bodyPr/>
-                    <a:lstStyle/>
-                    <a:p>
-                      <a:pPr algn="l"/>
-                      <a:r>
-                        <a:rPr lang="es-AR" dirty="0" smtClean="0"/>
-                        <a:t>Soporte del Framework</a:t>
-                      </a:r>
-                      <a:endParaRPr lang="es-AR" dirty="0"/>
-                    </a:p>
-                  </a:txBody>
-                  <a:tcPr/>
-                </a:tc>
-                <a:tc>
-                  <a:txBody>
-                    <a:bodyPr/>
-                    <a:lstStyle/>
-                    <a:p>
-                      <a:pPr marL="0" marR="0" indent="0" algn="l" defTabSz="914400" rtl="0" eaLnBrk="1" fontAlgn="auto" latinLnBrk="0" hangingPunct="1">
-                        <a:lnSpc>
-                          <a:spcPct val="100000"/>
-                        </a:lnSpc>
-                        <a:spcBef>
-                          <a:spcPts val="0"/>
-                        </a:spcBef>
-                        <a:spcAft>
-                          <a:spcPts val="0"/>
-                        </a:spcAft>
-                        <a:buClrTx/>
-                        <a:buSzTx/>
-                        <a:buFontTx/>
-                        <a:buNone/>
-                        <a:tabLst/>
-                        <a:defRPr/>
-                      </a:pPr>
-                      <a:r>
-                        <a:rPr lang="es-AR" sz="1400" b="0" i="0" kern="1200" dirty="0" smtClean="0">
-                          <a:solidFill>
-                            <a:schemeClr val="dk1"/>
-                          </a:solidFill>
-                          <a:effectLst/>
-                          <a:latin typeface="+mn-lt"/>
-                          <a:ea typeface="+mn-ea"/>
-                          <a:cs typeface="+mn-cs"/>
-                        </a:rPr>
-                        <a:t>Librería de clases relativamente pequeña y adaptable</a:t>
-                      </a:r>
-                      <a:endParaRPr lang="es-AR" sz="1400" b="0" i="0" kern="1200" dirty="0">
-                        <a:solidFill>
-                          <a:schemeClr val="dk1"/>
-                        </a:solidFill>
-                        <a:effectLst/>
-                        <a:latin typeface="+mn-lt"/>
-                        <a:ea typeface="+mn-ea"/>
-                        <a:cs typeface="+mn-cs"/>
-                      </a:endParaRPr>
-                    </a:p>
-                  </a:txBody>
-                  <a:tcPr/>
-                </a:tc>
-                <a:tc>
-                  <a:txBody>
-                    <a:bodyPr/>
-                    <a:lstStyle/>
-                    <a:p>
-                      <a:pPr marL="0" marR="0" indent="0" algn="l" defTabSz="914400" rtl="0" eaLnBrk="1" fontAlgn="auto" latinLnBrk="0" hangingPunct="1">
-                        <a:lnSpc>
-                          <a:spcPct val="100000"/>
-                        </a:lnSpc>
-                        <a:spcBef>
-                          <a:spcPts val="0"/>
-                        </a:spcBef>
-                        <a:spcAft>
-                          <a:spcPts val="0"/>
-                        </a:spcAft>
-                        <a:buClrTx/>
-                        <a:buSzTx/>
-                        <a:buFontTx/>
-                        <a:buNone/>
-                        <a:tabLst/>
-                        <a:defRPr/>
-                      </a:pPr>
-                      <a:r>
-                        <a:rPr lang="es-AR" sz="1400" b="0" i="0" kern="1200" dirty="0" smtClean="0">
-                          <a:solidFill>
-                            <a:schemeClr val="dk1"/>
-                          </a:solidFill>
-                          <a:effectLst/>
-                          <a:latin typeface="+mn-lt"/>
-                          <a:ea typeface="+mn-ea"/>
-                          <a:cs typeface="+mn-cs"/>
-                        </a:rPr>
-                        <a:t>Debe tener acceso a toda las librerías de .NET y los ensamblados</a:t>
-                      </a:r>
-                      <a:endParaRPr lang="es-AR" sz="1400" b="0" i="0" kern="1200" dirty="0">
-                        <a:solidFill>
-                          <a:schemeClr val="dk1"/>
-                        </a:solidFill>
-                        <a:effectLst/>
-                        <a:latin typeface="+mn-lt"/>
-                        <a:ea typeface="+mn-ea"/>
-                        <a:cs typeface="+mn-cs"/>
-                      </a:endParaRPr>
-                    </a:p>
-                  </a:txBody>
-                  <a:tcPr/>
-                </a:tc>
-              </a:tr>
-              <a:tr h="702445">
-                <a:tc>
-                  <a:txBody>
-                    <a:bodyPr/>
-                    <a:lstStyle/>
-                    <a:p>
-                      <a:pPr algn="l"/>
-                      <a:r>
-                        <a:rPr lang="es-AR" dirty="0" smtClean="0"/>
-                        <a:t>Despliegue</a:t>
-                      </a:r>
-                      <a:endParaRPr lang="es-AR" dirty="0"/>
-                    </a:p>
-                  </a:txBody>
-                  <a:tcPr/>
-                </a:tc>
-                <a:tc>
-                  <a:txBody>
-                    <a:bodyPr/>
-                    <a:lstStyle/>
-                    <a:p>
-                      <a:pPr marL="0" marR="0" indent="0" algn="l" defTabSz="914400" rtl="0" eaLnBrk="1" fontAlgn="auto" latinLnBrk="0" hangingPunct="1">
-                        <a:lnSpc>
-                          <a:spcPct val="100000"/>
-                        </a:lnSpc>
-                        <a:spcBef>
-                          <a:spcPts val="0"/>
-                        </a:spcBef>
-                        <a:spcAft>
-                          <a:spcPts val="0"/>
-                        </a:spcAft>
-                        <a:buClrTx/>
-                        <a:buSzTx/>
-                        <a:buFontTx/>
-                        <a:buNone/>
-                        <a:tabLst/>
-                        <a:defRPr/>
-                      </a:pPr>
-                      <a:r>
-                        <a:rPr lang="es-AR" sz="1400" b="0" i="0" kern="1200" dirty="0" smtClean="0">
-                          <a:solidFill>
-                            <a:schemeClr val="dk1"/>
-                          </a:solidFill>
-                          <a:effectLst/>
-                          <a:latin typeface="+mn-lt"/>
-                          <a:ea typeface="+mn-ea"/>
-                          <a:cs typeface="+mn-cs"/>
-                        </a:rPr>
-                        <a:t>Las App Silverlight se hospedan en los servidores y en los clientes Web.</a:t>
-                      </a:r>
-                      <a:endParaRPr lang="es-AR" sz="1400" b="0" i="0" kern="1200" dirty="0">
-                        <a:solidFill>
-                          <a:schemeClr val="dk1"/>
-                        </a:solidFill>
-                        <a:effectLst/>
-                        <a:latin typeface="+mn-lt"/>
-                        <a:ea typeface="+mn-ea"/>
-                        <a:cs typeface="+mn-cs"/>
-                      </a:endParaRPr>
-                    </a:p>
-                  </a:txBody>
-                  <a:tcPr/>
-                </a:tc>
-                <a:tc>
-                  <a:txBody>
-                    <a:bodyPr/>
-                    <a:lstStyle/>
-                    <a:p>
-                      <a:pPr marL="0" marR="0" indent="0" algn="l" defTabSz="914400" rtl="0" eaLnBrk="1" fontAlgn="auto" latinLnBrk="0" hangingPunct="1">
-                        <a:lnSpc>
-                          <a:spcPct val="100000"/>
-                        </a:lnSpc>
-                        <a:spcBef>
-                          <a:spcPts val="0"/>
-                        </a:spcBef>
-                        <a:spcAft>
-                          <a:spcPts val="0"/>
-                        </a:spcAft>
-                        <a:buClrTx/>
-                        <a:buSzTx/>
-                        <a:buFontTx/>
-                        <a:buNone/>
-                        <a:tabLst/>
-                        <a:defRPr/>
-                      </a:pPr>
-                      <a:r>
-                        <a:rPr lang="es-AR" sz="1400" b="0" i="0" kern="1200" dirty="0" smtClean="0">
-                          <a:solidFill>
-                            <a:schemeClr val="dk1"/>
-                          </a:solidFill>
-                          <a:effectLst/>
-                          <a:latin typeface="+mn-lt"/>
-                          <a:ea typeface="+mn-ea"/>
-                          <a:cs typeface="+mn-cs"/>
-                        </a:rPr>
-                        <a:t>Se pueden instalar como aplicaciones </a:t>
-                      </a:r>
-                      <a:r>
-                        <a:rPr lang="es-AR" sz="1400" b="0" i="0" kern="1200" dirty="0" err="1" smtClean="0">
-                          <a:solidFill>
-                            <a:schemeClr val="dk1"/>
-                          </a:solidFill>
-                          <a:effectLst/>
-                          <a:latin typeface="+mn-lt"/>
-                          <a:ea typeface="+mn-ea"/>
-                          <a:cs typeface="+mn-cs"/>
-                        </a:rPr>
-                        <a:t>standalone</a:t>
-                      </a:r>
-                      <a:r>
-                        <a:rPr lang="es-AR" sz="1400" b="0" i="0" kern="1200" dirty="0" smtClean="0">
-                          <a:solidFill>
-                            <a:schemeClr val="dk1"/>
-                          </a:solidFill>
-                          <a:effectLst/>
-                          <a:latin typeface="+mn-lt"/>
-                          <a:ea typeface="+mn-ea"/>
-                          <a:cs typeface="+mn-cs"/>
-                        </a:rPr>
-                        <a:t>.</a:t>
-                      </a:r>
-                      <a:endParaRPr lang="es-AR" sz="1400" b="0" i="0" kern="1200" dirty="0">
-                        <a:solidFill>
-                          <a:schemeClr val="dk1"/>
-                        </a:solidFill>
-                        <a:effectLst/>
-                        <a:latin typeface="+mn-lt"/>
-                        <a:ea typeface="+mn-ea"/>
-                        <a:cs typeface="+mn-cs"/>
-                      </a:endParaRPr>
-                    </a:p>
-                  </a:txBody>
-                  <a:tcPr/>
-                </a:tc>
-              </a:tr>
-            </a:tbl>
-          </a:graphicData>
-        </a:graphic>
-      </p:graphicFrame>
-      <p:sp>
-        <p:nvSpPr>
           <p:cNvPr id="3" name="2 Marcador de fecha"/>
           <p:cNvSpPr>
             <a:spLocks noGrp="1"/>
@@ -37254,9 +35364,9 @@
           <a:bodyPr/>
           <a:lstStyle/>
           <a:p>
-            <a:fld id="{3D07A7DC-D748-4A06-AFB1-6A3633FE248F}" type="datetime1">
+            <a:fld id="{89F5032E-2175-444E-9EC8-0A131EA1CD7F}" type="datetime1">
               <a:rPr lang="es-ES" smtClean="0"/>
-              <a:t>22/05/2014</a:t>
+              <a:t>29/05/2014</a:t>
             </a:fld>
             <a:endParaRPr lang="es-ES"/>
           </a:p>
@@ -37287,1178 +35397,6 @@
       </p:sp>
       <p:sp>
         <p:nvSpPr>
-          <p:cNvPr id="6" name="5 Marcador de número de diapositiva"/>
-          <p:cNvSpPr>
-            <a:spLocks noGrp="1"/>
-          </p:cNvSpPr>
-          <p:nvPr>
-            <p:ph type="sldNum" sz="quarter" idx="12"/>
-          </p:nvPr>
-        </p:nvSpPr>
-        <p:spPr/>
-        <p:txBody>
-          <a:bodyPr/>
-          <a:lstStyle/>
-          <a:p>
-            <a:fld id="{132FADFE-3B8F-471C-ABF0-DBC7717ECBBC}" type="slidenum">
-              <a:rPr lang="es-ES" smtClean="0"/>
-              <a:pPr/>
-              <a:t>43</a:t>
-            </a:fld>
-            <a:endParaRPr lang="es-ES"/>
-          </a:p>
-        </p:txBody>
-      </p:sp>
-    </p:spTree>
-    <p:extLst>
-      <p:ext uri="{BB962C8B-B14F-4D97-AF65-F5344CB8AC3E}">
-        <p14:creationId xmlns:p14="http://schemas.microsoft.com/office/powerpoint/2010/main" val="3764485665"/>
-      </p:ext>
-    </p:extLst>
-  </p:cSld>
-  <p:clrMapOvr>
-    <a:masterClrMapping/>
-  </p:clrMapOvr>
-  <p:timing>
-    <p:tnLst>
-      <p:par>
-        <p:cTn id="1" dur="indefinite" restart="never" nodeType="tmRoot"/>
-      </p:par>
-    </p:tnLst>
-  </p:timing>
-</p:sld>
-</file>
-
-<file path=ppt/slides/slide44.xml><?xml version="1.0" encoding="utf-8"?>
-<p:sld xmlns:a="http://schemas.openxmlformats.org/drawingml/2006/main" xmlns:r="http://schemas.openxmlformats.org/officeDocument/2006/relationships" xmlns:p="http://schemas.openxmlformats.org/presentationml/2006/main">
-  <p:cSld>
-    <p:spTree>
-      <p:nvGrpSpPr>
-        <p:cNvPr id="1" name=""/>
-        <p:cNvGrpSpPr/>
-        <p:nvPr/>
-      </p:nvGrpSpPr>
-      <p:grpSpPr>
-        <a:xfrm>
-          <a:off x="0" y="0"/>
-          <a:ext cx="0" cy="0"/>
-          <a:chOff x="0" y="0"/>
-          <a:chExt cx="0" cy="0"/>
-        </a:xfrm>
-      </p:grpSpPr>
-      <p:sp>
-        <p:nvSpPr>
-          <p:cNvPr id="2" name="1 Título"/>
-          <p:cNvSpPr>
-            <a:spLocks noGrp="1"/>
-          </p:cNvSpPr>
-          <p:nvPr>
-            <p:ph type="title"/>
-          </p:nvPr>
-        </p:nvSpPr>
-        <p:spPr/>
-        <p:txBody>
-          <a:bodyPr/>
-          <a:lstStyle/>
-          <a:p>
-            <a:r>
-              <a:rPr lang="es-AR" dirty="0" smtClean="0"/>
-              <a:t>Aplicación </a:t>
-            </a:r>
-            <a:r>
-              <a:rPr lang="es-AR" dirty="0" err="1" smtClean="0"/>
-              <a:t>Silverligth</a:t>
-            </a:r>
-            <a:endParaRPr lang="es-AR" dirty="0"/>
-          </a:p>
-        </p:txBody>
-      </p:sp>
-      <p:sp>
-        <p:nvSpPr>
-          <p:cNvPr id="3" name="2 Marcador de contenido"/>
-          <p:cNvSpPr>
-            <a:spLocks noGrp="1"/>
-          </p:cNvSpPr>
-          <p:nvPr>
-            <p:ph sz="quarter" idx="13"/>
-          </p:nvPr>
-        </p:nvSpPr>
-        <p:spPr/>
-        <p:txBody>
-          <a:bodyPr/>
-          <a:lstStyle/>
-          <a:p>
-            <a:r>
-              <a:rPr lang="es-AR" dirty="0" smtClean="0"/>
-              <a:t>Se debe seleccionar sobre que tipo de aplicación web corre.</a:t>
-            </a:r>
-          </a:p>
-          <a:p>
-            <a:r>
-              <a:rPr lang="es-AR" dirty="0" smtClean="0"/>
-              <a:t>Se puede seleccionar es uso del servicios WCF	</a:t>
-            </a:r>
-            <a:endParaRPr lang="es-AR" dirty="0"/>
-          </a:p>
-        </p:txBody>
-      </p:sp>
-      <p:pic>
-        <p:nvPicPr>
-          <p:cNvPr id="2050" name="Picture 2"/>
-          <p:cNvPicPr>
-            <a:picLocks noChangeAspect="1" noChangeArrowheads="1"/>
-          </p:cNvPicPr>
-          <p:nvPr/>
-        </p:nvPicPr>
-        <p:blipFill>
-          <a:blip r:embed="rId3">
-            <a:extLst>
-              <a:ext uri="{28A0092B-C50C-407E-A947-70E740481C1C}">
-                <a14:useLocalDpi xmlns:a14="http://schemas.microsoft.com/office/drawing/2010/main" val="0"/>
-              </a:ext>
-            </a:extLst>
-          </a:blip>
-          <a:srcRect/>
-          <a:stretch>
-            <a:fillRect/>
-          </a:stretch>
-        </p:blipFill>
-        <p:spPr bwMode="auto">
-          <a:xfrm>
-            <a:off x="1187623" y="4054970"/>
-            <a:ext cx="2795173" cy="2285802"/>
-          </a:xfrm>
-          <a:prstGeom prst="rect">
-            <a:avLst/>
-          </a:prstGeom>
-          <a:noFill/>
-          <a:ln>
-            <a:noFill/>
-          </a:ln>
-          <a:effectLst/>
-          <a:extLst>
-            <a:ext uri="{909E8E84-426E-40DD-AFC4-6F175D3DCCD1}">
-              <a14:hiddenFill xmlns:a14="http://schemas.microsoft.com/office/drawing/2010/main">
-                <a:solidFill>
-                  <a:schemeClr val="accent1"/>
-                </a:solidFill>
-              </a14:hiddenFill>
-            </a:ext>
-            <a:ext uri="{91240B29-F687-4F45-9708-019B960494DF}">
-              <a14:hiddenLine xmlns:a14="http://schemas.microsoft.com/office/drawing/2010/main" w="9525">
-                <a:solidFill>
-                  <a:schemeClr val="tx1"/>
-                </a:solidFill>
-                <a:miter lim="800000"/>
-                <a:headEnd/>
-                <a:tailEnd/>
-              </a14:hiddenLine>
-            </a:ext>
-            <a:ext uri="{AF507438-7753-43E0-B8FC-AC1667EBCBE1}">
-              <a14:hiddenEffects xmlns:a14="http://schemas.microsoft.com/office/drawing/2010/main">
-                <a:effectLst>
-                  <a:outerShdw dist="35921" dir="2700000" algn="ctr" rotWithShape="0">
-                    <a:schemeClr val="bg2"/>
-                  </a:outerShdw>
-                </a:effectLst>
-              </a14:hiddenEffects>
-            </a:ext>
-          </a:extLst>
-        </p:spPr>
-      </p:pic>
-      <p:pic>
-        <p:nvPicPr>
-          <p:cNvPr id="2051" name="Picture 3"/>
-          <p:cNvPicPr>
-            <a:picLocks noChangeAspect="1" noChangeArrowheads="1"/>
-          </p:cNvPicPr>
-          <p:nvPr/>
-        </p:nvPicPr>
-        <p:blipFill>
-          <a:blip r:embed="rId4">
-            <a:extLst>
-              <a:ext uri="{28A0092B-C50C-407E-A947-70E740481C1C}">
-                <a14:useLocalDpi xmlns:a14="http://schemas.microsoft.com/office/drawing/2010/main" val="0"/>
-              </a:ext>
-            </a:extLst>
-          </a:blip>
-          <a:srcRect/>
-          <a:stretch>
-            <a:fillRect/>
-          </a:stretch>
-        </p:blipFill>
-        <p:spPr bwMode="auto">
-          <a:xfrm>
-            <a:off x="5508104" y="1556792"/>
-            <a:ext cx="2023412" cy="4790726"/>
-          </a:xfrm>
-          <a:prstGeom prst="rect">
-            <a:avLst/>
-          </a:prstGeom>
-          <a:noFill/>
-          <a:ln>
-            <a:noFill/>
-          </a:ln>
-          <a:effectLst/>
-          <a:extLst>
-            <a:ext uri="{909E8E84-426E-40DD-AFC4-6F175D3DCCD1}">
-              <a14:hiddenFill xmlns:a14="http://schemas.microsoft.com/office/drawing/2010/main">
-                <a:solidFill>
-                  <a:schemeClr val="accent1"/>
-                </a:solidFill>
-              </a14:hiddenFill>
-            </a:ext>
-            <a:ext uri="{91240B29-F687-4F45-9708-019B960494DF}">
-              <a14:hiddenLine xmlns:a14="http://schemas.microsoft.com/office/drawing/2010/main" w="9525">
-                <a:solidFill>
-                  <a:schemeClr val="tx1"/>
-                </a:solidFill>
-                <a:miter lim="800000"/>
-                <a:headEnd/>
-                <a:tailEnd/>
-              </a14:hiddenLine>
-            </a:ext>
-            <a:ext uri="{AF507438-7753-43E0-B8FC-AC1667EBCBE1}">
-              <a14:hiddenEffects xmlns:a14="http://schemas.microsoft.com/office/drawing/2010/main">
-                <a:effectLst>
-                  <a:outerShdw dist="35921" dir="2700000" algn="ctr" rotWithShape="0">
-                    <a:schemeClr val="bg2"/>
-                  </a:outerShdw>
-                </a:effectLst>
-              </a14:hiddenEffects>
-            </a:ext>
-          </a:extLst>
-        </p:spPr>
-      </p:pic>
-      <p:sp>
-        <p:nvSpPr>
-          <p:cNvPr id="4" name="3 Marcador de fecha"/>
-          <p:cNvSpPr>
-            <a:spLocks noGrp="1"/>
-          </p:cNvSpPr>
-          <p:nvPr>
-            <p:ph type="dt" sz="half" idx="10"/>
-          </p:nvPr>
-        </p:nvSpPr>
-        <p:spPr/>
-        <p:txBody>
-          <a:bodyPr/>
-          <a:lstStyle/>
-          <a:p>
-            <a:fld id="{ED7612E3-E9D1-49D0-866A-0F47CCE2755D}" type="datetime1">
-              <a:rPr lang="es-ES" smtClean="0"/>
-              <a:t>22/05/2014</a:t>
-            </a:fld>
-            <a:endParaRPr lang="es-ES"/>
-          </a:p>
-        </p:txBody>
-      </p:sp>
-      <p:sp>
-        <p:nvSpPr>
-          <p:cNvPr id="5" name="4 Marcador de pie de página"/>
-          <p:cNvSpPr>
-            <a:spLocks noGrp="1"/>
-          </p:cNvSpPr>
-          <p:nvPr>
-            <p:ph type="ftr" sz="quarter" idx="11"/>
-          </p:nvPr>
-        </p:nvSpPr>
-        <p:spPr/>
-        <p:txBody>
-          <a:bodyPr/>
-          <a:lstStyle/>
-          <a:p>
-            <a:r>
-              <a:rPr lang="es-AR" smtClean="0"/>
-              <a:t>Introducción a la Plataforma .NET – Capa de Presentacion</a:t>
-            </a:r>
-            <a:endParaRPr lang="es-ES"/>
-          </a:p>
-        </p:txBody>
-      </p:sp>
-      <p:sp>
-        <p:nvSpPr>
-          <p:cNvPr id="6" name="5 Marcador de número de diapositiva"/>
-          <p:cNvSpPr>
-            <a:spLocks noGrp="1"/>
-          </p:cNvSpPr>
-          <p:nvPr>
-            <p:ph type="sldNum" sz="quarter" idx="12"/>
-          </p:nvPr>
-        </p:nvSpPr>
-        <p:spPr/>
-        <p:txBody>
-          <a:bodyPr/>
-          <a:lstStyle/>
-          <a:p>
-            <a:fld id="{132FADFE-3B8F-471C-ABF0-DBC7717ECBBC}" type="slidenum">
-              <a:rPr lang="es-ES" smtClean="0"/>
-              <a:pPr/>
-              <a:t>44</a:t>
-            </a:fld>
-            <a:endParaRPr lang="es-ES"/>
-          </a:p>
-        </p:txBody>
-      </p:sp>
-    </p:spTree>
-    <p:extLst>
-      <p:ext uri="{BB962C8B-B14F-4D97-AF65-F5344CB8AC3E}">
-        <p14:creationId xmlns:p14="http://schemas.microsoft.com/office/powerpoint/2010/main" val="3729482284"/>
-      </p:ext>
-    </p:extLst>
-  </p:cSld>
-  <p:clrMapOvr>
-    <a:masterClrMapping/>
-  </p:clrMapOvr>
-  <p:timing>
-    <p:tnLst>
-      <p:par>
-        <p:cTn id="1" dur="indefinite" restart="never" nodeType="tmRoot"/>
-      </p:par>
-    </p:tnLst>
-  </p:timing>
-</p:sld>
-</file>
-
-<file path=ppt/slides/slide45.xml><?xml version="1.0" encoding="utf-8"?>
-<p:sld xmlns:a="http://schemas.openxmlformats.org/drawingml/2006/main" xmlns:r="http://schemas.openxmlformats.org/officeDocument/2006/relationships" xmlns:p="http://schemas.openxmlformats.org/presentationml/2006/main">
-  <p:cSld>
-    <p:spTree>
-      <p:nvGrpSpPr>
-        <p:cNvPr id="1" name=""/>
-        <p:cNvGrpSpPr/>
-        <p:nvPr/>
-      </p:nvGrpSpPr>
-      <p:grpSpPr>
-        <a:xfrm>
-          <a:off x="0" y="0"/>
-          <a:ext cx="0" cy="0"/>
-          <a:chOff x="0" y="0"/>
-          <a:chExt cx="0" cy="0"/>
-        </a:xfrm>
-      </p:grpSpPr>
-      <p:sp>
-        <p:nvSpPr>
-          <p:cNvPr id="2" name="1 Título"/>
-          <p:cNvSpPr>
-            <a:spLocks noGrp="1"/>
-          </p:cNvSpPr>
-          <p:nvPr>
-            <p:ph type="title"/>
-          </p:nvPr>
-        </p:nvSpPr>
-        <p:spPr/>
-        <p:txBody>
-          <a:bodyPr>
-            <a:normAutofit fontScale="90000"/>
-          </a:bodyPr>
-          <a:lstStyle/>
-          <a:p>
-            <a:r>
-              <a:rPr lang="es-AR" dirty="0" smtClean="0"/>
-              <a:t>Componentes de una Aplicación (1)</a:t>
-            </a:r>
-            <a:endParaRPr lang="es-AR" dirty="0"/>
-          </a:p>
-        </p:txBody>
-      </p:sp>
-      <p:sp>
-        <p:nvSpPr>
-          <p:cNvPr id="3" name="2 Marcador de contenido"/>
-          <p:cNvSpPr>
-            <a:spLocks noGrp="1"/>
-          </p:cNvSpPr>
-          <p:nvPr>
-            <p:ph sz="quarter" idx="13"/>
-          </p:nvPr>
-        </p:nvSpPr>
-        <p:spPr>
-          <a:xfrm>
-            <a:off x="539552" y="1657579"/>
-            <a:ext cx="4031303" cy="4353664"/>
-          </a:xfrm>
-        </p:spPr>
-        <p:txBody>
-          <a:bodyPr/>
-          <a:lstStyle/>
-          <a:p>
-            <a:r>
-              <a:rPr lang="es-AR" dirty="0" smtClean="0"/>
-              <a:t>Existen dos proyectos:</a:t>
-            </a:r>
-          </a:p>
-          <a:p>
-            <a:pPr lvl="1"/>
-            <a:r>
-              <a:rPr lang="es-AR" dirty="0" smtClean="0"/>
-              <a:t>Uno para </a:t>
-            </a:r>
-            <a:r>
-              <a:rPr lang="es-AR" dirty="0" err="1" smtClean="0"/>
-              <a:t>Silverligth</a:t>
-            </a:r>
-            <a:endParaRPr lang="es-AR" dirty="0" smtClean="0"/>
-          </a:p>
-          <a:p>
-            <a:pPr lvl="1"/>
-            <a:endParaRPr lang="es-AR" dirty="0"/>
-          </a:p>
-          <a:p>
-            <a:pPr lvl="1"/>
-            <a:r>
-              <a:rPr lang="es-AR" dirty="0" smtClean="0"/>
-              <a:t>Uno para aplicación web</a:t>
-            </a:r>
-          </a:p>
-          <a:p>
-            <a:pPr lvl="1"/>
-            <a:endParaRPr lang="es-AR" dirty="0"/>
-          </a:p>
-          <a:p>
-            <a:r>
-              <a:rPr lang="es-AR" dirty="0" smtClean="0"/>
-              <a:t>Se dice que la página web hospeda a la </a:t>
-            </a:r>
-            <a:r>
-              <a:rPr lang="es-AR" dirty="0" err="1" smtClean="0"/>
-              <a:t>applicacion</a:t>
-            </a:r>
-            <a:r>
-              <a:rPr lang="es-AR" dirty="0" smtClean="0"/>
-              <a:t> </a:t>
-            </a:r>
-            <a:r>
-              <a:rPr lang="es-AR" dirty="0" err="1" smtClean="0"/>
-              <a:t>silverligth</a:t>
-            </a:r>
-            <a:endParaRPr lang="es-AR" dirty="0"/>
-          </a:p>
-        </p:txBody>
-      </p:sp>
-      <p:pic>
-        <p:nvPicPr>
-          <p:cNvPr id="3074" name="Picture 2"/>
-          <p:cNvPicPr>
-            <a:picLocks noChangeAspect="1" noChangeArrowheads="1"/>
-          </p:cNvPicPr>
-          <p:nvPr/>
-        </p:nvPicPr>
-        <p:blipFill>
-          <a:blip r:embed="rId3">
-            <a:extLst>
-              <a:ext uri="{28A0092B-C50C-407E-A947-70E740481C1C}">
-                <a14:useLocalDpi xmlns:a14="http://schemas.microsoft.com/office/drawing/2010/main" val="0"/>
-              </a:ext>
-            </a:extLst>
-          </a:blip>
-          <a:srcRect/>
-          <a:stretch>
-            <a:fillRect/>
-          </a:stretch>
-        </p:blipFill>
-        <p:spPr bwMode="auto">
-          <a:xfrm>
-            <a:off x="4827310" y="2564904"/>
-            <a:ext cx="3879874" cy="3879874"/>
-          </a:xfrm>
-          <a:prstGeom prst="rect">
-            <a:avLst/>
-          </a:prstGeom>
-          <a:noFill/>
-          <a:ln>
-            <a:noFill/>
-          </a:ln>
-          <a:effectLst/>
-          <a:extLst>
-            <a:ext uri="{909E8E84-426E-40DD-AFC4-6F175D3DCCD1}">
-              <a14:hiddenFill xmlns:a14="http://schemas.microsoft.com/office/drawing/2010/main">
-                <a:solidFill>
-                  <a:schemeClr val="accent1"/>
-                </a:solidFill>
-              </a14:hiddenFill>
-            </a:ext>
-            <a:ext uri="{91240B29-F687-4F45-9708-019B960494DF}">
-              <a14:hiddenLine xmlns:a14="http://schemas.microsoft.com/office/drawing/2010/main" w="9525">
-                <a:solidFill>
-                  <a:schemeClr val="tx1"/>
-                </a:solidFill>
-                <a:miter lim="800000"/>
-                <a:headEnd/>
-                <a:tailEnd/>
-              </a14:hiddenLine>
-            </a:ext>
-            <a:ext uri="{AF507438-7753-43E0-B8FC-AC1667EBCBE1}">
-              <a14:hiddenEffects xmlns:a14="http://schemas.microsoft.com/office/drawing/2010/main">
-                <a:effectLst>
-                  <a:outerShdw dist="35921" dir="2700000" algn="ctr" rotWithShape="0">
-                    <a:schemeClr val="bg2"/>
-                  </a:outerShdw>
-                </a:effectLst>
-              </a14:hiddenEffects>
-            </a:ext>
-          </a:extLst>
-        </p:spPr>
-      </p:pic>
-      <p:pic>
-        <p:nvPicPr>
-          <p:cNvPr id="3075" name="Picture 3"/>
-          <p:cNvPicPr>
-            <a:picLocks noChangeAspect="1" noChangeArrowheads="1"/>
-          </p:cNvPicPr>
-          <p:nvPr/>
-        </p:nvPicPr>
-        <p:blipFill>
-          <a:blip r:embed="rId4" cstate="print">
-            <a:extLst>
-              <a:ext uri="{28A0092B-C50C-407E-A947-70E740481C1C}">
-                <a14:useLocalDpi xmlns:a14="http://schemas.microsoft.com/office/drawing/2010/main" val="0"/>
-              </a:ext>
-            </a:extLst>
-          </a:blip>
-          <a:srcRect/>
-          <a:stretch>
-            <a:fillRect/>
-          </a:stretch>
-        </p:blipFill>
-        <p:spPr bwMode="auto">
-          <a:xfrm>
-            <a:off x="4827310" y="5789690"/>
-            <a:ext cx="785524" cy="785524"/>
-          </a:xfrm>
-          <a:prstGeom prst="rect">
-            <a:avLst/>
-          </a:prstGeom>
-          <a:noFill/>
-          <a:ln>
-            <a:noFill/>
-          </a:ln>
-          <a:effectLst/>
-          <a:extLst>
-            <a:ext uri="{909E8E84-426E-40DD-AFC4-6F175D3DCCD1}">
-              <a14:hiddenFill xmlns:a14="http://schemas.microsoft.com/office/drawing/2010/main">
-                <a:solidFill>
-                  <a:schemeClr val="accent1"/>
-                </a:solidFill>
-              </a14:hiddenFill>
-            </a:ext>
-            <a:ext uri="{91240B29-F687-4F45-9708-019B960494DF}">
-              <a14:hiddenLine xmlns:a14="http://schemas.microsoft.com/office/drawing/2010/main" w="9525">
-                <a:solidFill>
-                  <a:schemeClr val="tx1"/>
-                </a:solidFill>
-                <a:miter lim="800000"/>
-                <a:headEnd/>
-                <a:tailEnd/>
-              </a14:hiddenLine>
-            </a:ext>
-            <a:ext uri="{AF507438-7753-43E0-B8FC-AC1667EBCBE1}">
-              <a14:hiddenEffects xmlns:a14="http://schemas.microsoft.com/office/drawing/2010/main">
-                <a:effectLst>
-                  <a:outerShdw dist="35921" dir="2700000" algn="ctr" rotWithShape="0">
-                    <a:schemeClr val="bg2"/>
-                  </a:outerShdw>
-                </a:effectLst>
-              </a14:hiddenEffects>
-            </a:ext>
-          </a:extLst>
-        </p:spPr>
-      </p:pic>
-      <p:sp>
-        <p:nvSpPr>
-          <p:cNvPr id="5" name="4 Flecha curvada hacia abajo"/>
-          <p:cNvSpPr/>
-          <p:nvPr/>
-        </p:nvSpPr>
-        <p:spPr>
-          <a:xfrm>
-            <a:off x="3915750" y="4437112"/>
-            <a:ext cx="1952394" cy="432048"/>
-          </a:xfrm>
-          <a:prstGeom prst="curvedDownArrow">
-            <a:avLst/>
-          </a:prstGeom>
-        </p:spPr>
-        <p:style>
-          <a:lnRef idx="2">
-            <a:schemeClr val="accent1">
-              <a:shade val="50000"/>
-            </a:schemeClr>
-          </a:lnRef>
-          <a:fillRef idx="1">
-            <a:schemeClr val="accent1"/>
-          </a:fillRef>
-          <a:effectRef idx="0">
-            <a:schemeClr val="accent1"/>
-          </a:effectRef>
-          <a:fontRef idx="minor">
-            <a:schemeClr val="lt1"/>
-          </a:fontRef>
-        </p:style>
-        <p:txBody>
-          <a:bodyPr rtlCol="0" anchor="ctr"/>
-          <a:lstStyle/>
-          <a:p>
-            <a:pPr algn="ctr"/>
-            <a:endParaRPr lang="es-AR">
-              <a:solidFill>
-                <a:schemeClr val="tx1"/>
-              </a:solidFill>
-            </a:endParaRPr>
-          </a:p>
-        </p:txBody>
-      </p:sp>
-      <p:sp>
-        <p:nvSpPr>
-          <p:cNvPr id="6" name="5 Flecha curvada hacia arriba"/>
-          <p:cNvSpPr/>
-          <p:nvPr/>
-        </p:nvSpPr>
-        <p:spPr>
-          <a:xfrm rot="19628065">
-            <a:off x="5951877" y="5681421"/>
-            <a:ext cx="1340884" cy="576064"/>
-          </a:xfrm>
-          <a:prstGeom prst="curvedUpArrow">
-            <a:avLst/>
-          </a:prstGeom>
-        </p:spPr>
-        <p:style>
-          <a:lnRef idx="2">
-            <a:schemeClr val="accent1">
-              <a:shade val="50000"/>
-            </a:schemeClr>
-          </a:lnRef>
-          <a:fillRef idx="1">
-            <a:schemeClr val="accent1"/>
-          </a:fillRef>
-          <a:effectRef idx="0">
-            <a:schemeClr val="accent1"/>
-          </a:effectRef>
-          <a:fontRef idx="minor">
-            <a:schemeClr val="lt1"/>
-          </a:fontRef>
-        </p:style>
-        <p:txBody>
-          <a:bodyPr rtlCol="0" anchor="ctr"/>
-          <a:lstStyle/>
-          <a:p>
-            <a:pPr algn="ctr"/>
-            <a:endParaRPr lang="es-AR">
-              <a:solidFill>
-                <a:schemeClr val="tx1"/>
-              </a:solidFill>
-            </a:endParaRPr>
-          </a:p>
-        </p:txBody>
-      </p:sp>
-      <p:sp>
-        <p:nvSpPr>
-          <p:cNvPr id="7" name="Document"/>
-          <p:cNvSpPr>
-            <a:spLocks noEditPoints="1" noChangeArrowheads="1"/>
-          </p:cNvSpPr>
-          <p:nvPr/>
-        </p:nvSpPr>
-        <p:spPr bwMode="auto">
-          <a:xfrm>
-            <a:off x="3275856" y="5013176"/>
-            <a:ext cx="1072537" cy="1284883"/>
-          </a:xfrm>
-          <a:custGeom>
-            <a:avLst/>
-            <a:gdLst>
-              <a:gd name="T0" fmla="*/ 10757 w 21600"/>
-              <a:gd name="T1" fmla="*/ 21632 h 21600"/>
-              <a:gd name="T2" fmla="*/ 85 w 21600"/>
-              <a:gd name="T3" fmla="*/ 10849 h 21600"/>
-              <a:gd name="T4" fmla="*/ 10757 w 21600"/>
-              <a:gd name="T5" fmla="*/ 81 h 21600"/>
-              <a:gd name="T6" fmla="*/ 21706 w 21600"/>
-              <a:gd name="T7" fmla="*/ 10652 h 21600"/>
-              <a:gd name="T8" fmla="*/ 10757 w 21600"/>
-              <a:gd name="T9" fmla="*/ 21632 h 21600"/>
-              <a:gd name="T10" fmla="*/ 0 w 21600"/>
-              <a:gd name="T11" fmla="*/ 0 h 21600"/>
-              <a:gd name="T12" fmla="*/ 21600 w 21600"/>
-              <a:gd name="T13" fmla="*/ 0 h 21600"/>
-              <a:gd name="T14" fmla="*/ 21600 w 21600"/>
-              <a:gd name="T15" fmla="*/ 21600 h 21600"/>
-              <a:gd name="T16" fmla="*/ 977 w 21600"/>
-              <a:gd name="T17" fmla="*/ 818 h 21600"/>
-              <a:gd name="T18" fmla="*/ 20622 w 21600"/>
-              <a:gd name="T19" fmla="*/ 16429 h 21600"/>
-            </a:gdLst>
-            <a:ahLst/>
-            <a:cxnLst>
-              <a:cxn ang="0">
-                <a:pos x="T0" y="T1"/>
-              </a:cxn>
-              <a:cxn ang="0">
-                <a:pos x="T2" y="T3"/>
-              </a:cxn>
-              <a:cxn ang="0">
-                <a:pos x="T4" y="T5"/>
-              </a:cxn>
-              <a:cxn ang="0">
-                <a:pos x="T6" y="T7"/>
-              </a:cxn>
-              <a:cxn ang="0">
-                <a:pos x="T8" y="T9"/>
-              </a:cxn>
-              <a:cxn ang="0">
-                <a:pos x="T10" y="T11"/>
-              </a:cxn>
-              <a:cxn ang="0">
-                <a:pos x="T12" y="T13"/>
-              </a:cxn>
-              <a:cxn ang="0">
-                <a:pos x="T14" y="T15"/>
-              </a:cxn>
-            </a:cxnLst>
-            <a:rect l="T16" t="T17" r="T18" b="T19"/>
-            <a:pathLst>
-              <a:path w="21600" h="21600">
-                <a:moveTo>
-                  <a:pt x="10757" y="21632"/>
-                </a:moveTo>
-                <a:lnTo>
-                  <a:pt x="5187" y="21632"/>
-                </a:lnTo>
-                <a:lnTo>
-                  <a:pt x="85" y="17509"/>
-                </a:lnTo>
-                <a:lnTo>
-                  <a:pt x="85" y="10849"/>
-                </a:lnTo>
-                <a:lnTo>
-                  <a:pt x="85" y="81"/>
-                </a:lnTo>
-                <a:lnTo>
-                  <a:pt x="10757" y="81"/>
-                </a:lnTo>
-                <a:lnTo>
-                  <a:pt x="21706" y="81"/>
-                </a:lnTo>
-                <a:lnTo>
-                  <a:pt x="21706" y="10652"/>
-                </a:lnTo>
-                <a:lnTo>
-                  <a:pt x="21706" y="21632"/>
-                </a:lnTo>
-                <a:lnTo>
-                  <a:pt x="10757" y="21632"/>
-                </a:lnTo>
-                <a:close/>
-              </a:path>
-              <a:path w="21600" h="21600">
-                <a:moveTo>
-                  <a:pt x="85" y="17509"/>
-                </a:moveTo>
-                <a:lnTo>
-                  <a:pt x="5187" y="17509"/>
-                </a:lnTo>
-                <a:lnTo>
-                  <a:pt x="5187" y="21632"/>
-                </a:lnTo>
-                <a:lnTo>
-                  <a:pt x="85" y="17509"/>
-                </a:lnTo>
-                <a:close/>
-              </a:path>
-            </a:pathLst>
-          </a:custGeom>
-          <a:solidFill>
-            <a:srgbClr val="D8EBB3"/>
-          </a:solidFill>
-          <a:ln w="9525">
-            <a:solidFill>
-              <a:srgbClr val="000000"/>
-            </a:solidFill>
-            <a:miter lim="800000"/>
-            <a:headEnd/>
-            <a:tailEnd/>
-          </a:ln>
-          <a:effectLst>
-            <a:outerShdw dist="107763" dir="2700000" algn="ctr" rotWithShape="0">
-              <a:srgbClr val="808080"/>
-            </a:outerShdw>
-          </a:effectLst>
-        </p:spPr>
-        <p:txBody>
-          <a:bodyPr vert="horz" wrap="square" lIns="91440" tIns="45720" rIns="91440" bIns="45720" numCol="1" anchor="t" anchorCtr="0" compatLnSpc="1">
-            <a:prstTxWarp prst="textNoShape">
-              <a:avLst/>
-            </a:prstTxWarp>
-          </a:bodyPr>
-          <a:lstStyle/>
-          <a:p>
-            <a:r>
-              <a:rPr lang="es-AR" sz="3200" dirty="0" smtClean="0"/>
-              <a:t>.</a:t>
-            </a:r>
-            <a:r>
-              <a:rPr lang="es-AR" sz="3200" dirty="0" err="1" smtClean="0"/>
-              <a:t>xap</a:t>
-            </a:r>
-            <a:endParaRPr lang="es-AR" sz="3200" dirty="0"/>
-          </a:p>
-        </p:txBody>
-      </p:sp>
-      <p:sp>
-        <p:nvSpPr>
-          <p:cNvPr id="8" name="7 Marcador de fecha"/>
-          <p:cNvSpPr>
-            <a:spLocks noGrp="1"/>
-          </p:cNvSpPr>
-          <p:nvPr>
-            <p:ph type="dt" sz="half" idx="10"/>
-          </p:nvPr>
-        </p:nvSpPr>
-        <p:spPr/>
-        <p:txBody>
-          <a:bodyPr/>
-          <a:lstStyle/>
-          <a:p>
-            <a:fld id="{4256F3C2-ADBF-4F5B-81C1-84A043B27926}" type="datetime1">
-              <a:rPr lang="es-ES" smtClean="0"/>
-              <a:t>22/05/2014</a:t>
-            </a:fld>
-            <a:endParaRPr lang="es-ES"/>
-          </a:p>
-        </p:txBody>
-      </p:sp>
-      <p:sp>
-        <p:nvSpPr>
-          <p:cNvPr id="9" name="8 Marcador de pie de página"/>
-          <p:cNvSpPr>
-            <a:spLocks noGrp="1"/>
-          </p:cNvSpPr>
-          <p:nvPr>
-            <p:ph type="ftr" sz="quarter" idx="11"/>
-          </p:nvPr>
-        </p:nvSpPr>
-        <p:spPr/>
-        <p:txBody>
-          <a:bodyPr/>
-          <a:lstStyle/>
-          <a:p>
-            <a:r>
-              <a:rPr lang="es-AR" smtClean="0"/>
-              <a:t>Introducción a la Plataforma .NET – Capa de Presentacion</a:t>
-            </a:r>
-            <a:endParaRPr lang="es-ES"/>
-          </a:p>
-        </p:txBody>
-      </p:sp>
-      <p:sp>
-        <p:nvSpPr>
-          <p:cNvPr id="10" name="9 Marcador de número de diapositiva"/>
-          <p:cNvSpPr>
-            <a:spLocks noGrp="1"/>
-          </p:cNvSpPr>
-          <p:nvPr>
-            <p:ph type="sldNum" sz="quarter" idx="12"/>
-          </p:nvPr>
-        </p:nvSpPr>
-        <p:spPr/>
-        <p:txBody>
-          <a:bodyPr/>
-          <a:lstStyle/>
-          <a:p>
-            <a:fld id="{132FADFE-3B8F-471C-ABF0-DBC7717ECBBC}" type="slidenum">
-              <a:rPr lang="es-ES" smtClean="0"/>
-              <a:pPr/>
-              <a:t>45</a:t>
-            </a:fld>
-            <a:endParaRPr lang="es-ES"/>
-          </a:p>
-        </p:txBody>
-      </p:sp>
-    </p:spTree>
-    <p:extLst>
-      <p:ext uri="{BB962C8B-B14F-4D97-AF65-F5344CB8AC3E}">
-        <p14:creationId xmlns:p14="http://schemas.microsoft.com/office/powerpoint/2010/main" val="172736163"/>
-      </p:ext>
-    </p:extLst>
-  </p:cSld>
-  <p:clrMapOvr>
-    <a:masterClrMapping/>
-  </p:clrMapOvr>
-  <p:timing>
-    <p:tnLst>
-      <p:par>
-        <p:cTn id="1" dur="indefinite" restart="never" nodeType="tmRoot"/>
-      </p:par>
-    </p:tnLst>
-  </p:timing>
-</p:sld>
-</file>
-
-<file path=ppt/slides/slide46.xml><?xml version="1.0" encoding="utf-8"?>
-<p:sld xmlns:a="http://schemas.openxmlformats.org/drawingml/2006/main" xmlns:r="http://schemas.openxmlformats.org/officeDocument/2006/relationships" xmlns:p="http://schemas.openxmlformats.org/presentationml/2006/main">
-  <p:cSld>
-    <p:spTree>
-      <p:nvGrpSpPr>
-        <p:cNvPr id="1" name=""/>
-        <p:cNvGrpSpPr/>
-        <p:nvPr/>
-      </p:nvGrpSpPr>
-      <p:grpSpPr>
-        <a:xfrm>
-          <a:off x="0" y="0"/>
-          <a:ext cx="0" cy="0"/>
-          <a:chOff x="0" y="0"/>
-          <a:chExt cx="0" cy="0"/>
-        </a:xfrm>
-      </p:grpSpPr>
-      <p:sp>
-        <p:nvSpPr>
-          <p:cNvPr id="3" name="2 Título"/>
-          <p:cNvSpPr>
-            <a:spLocks noGrp="1"/>
-          </p:cNvSpPr>
-          <p:nvPr>
-            <p:ph type="title"/>
-          </p:nvPr>
-        </p:nvSpPr>
-        <p:spPr/>
-        <p:txBody>
-          <a:bodyPr>
-            <a:normAutofit fontScale="90000"/>
-          </a:bodyPr>
-          <a:lstStyle/>
-          <a:p>
-            <a:r>
-              <a:rPr lang="es-AR" dirty="0"/>
-              <a:t>Componentes de una Aplicación </a:t>
-            </a:r>
-            <a:r>
-              <a:rPr lang="es-AR" dirty="0" smtClean="0"/>
-              <a:t>(2)</a:t>
-            </a:r>
-            <a:endParaRPr lang="es-AR" dirty="0"/>
-          </a:p>
-        </p:txBody>
-      </p:sp>
-      <p:pic>
-        <p:nvPicPr>
-          <p:cNvPr id="1027" name="Picture 3"/>
-          <p:cNvPicPr>
-            <a:picLocks noChangeAspect="1" noChangeArrowheads="1"/>
-          </p:cNvPicPr>
-          <p:nvPr/>
-        </p:nvPicPr>
-        <p:blipFill>
-          <a:blip r:embed="rId3">
-            <a:extLst>
-              <a:ext uri="{28A0092B-C50C-407E-A947-70E740481C1C}">
-                <a14:useLocalDpi xmlns:a14="http://schemas.microsoft.com/office/drawing/2010/main" val="0"/>
-              </a:ext>
-            </a:extLst>
-          </a:blip>
-          <a:srcRect/>
-          <a:stretch>
-            <a:fillRect/>
-          </a:stretch>
-        </p:blipFill>
-        <p:spPr bwMode="auto">
-          <a:xfrm>
-            <a:off x="1432539" y="1844824"/>
-            <a:ext cx="6229350" cy="4067175"/>
-          </a:xfrm>
-          <a:prstGeom prst="rect">
-            <a:avLst/>
-          </a:prstGeom>
-          <a:noFill/>
-          <a:ln>
-            <a:noFill/>
-          </a:ln>
-          <a:effectLst/>
-          <a:extLst>
-            <a:ext uri="{909E8E84-426E-40DD-AFC4-6F175D3DCCD1}">
-              <a14:hiddenFill xmlns:a14="http://schemas.microsoft.com/office/drawing/2010/main">
-                <a:solidFill>
-                  <a:schemeClr val="accent1"/>
-                </a:solidFill>
-              </a14:hiddenFill>
-            </a:ext>
-            <a:ext uri="{91240B29-F687-4F45-9708-019B960494DF}">
-              <a14:hiddenLine xmlns:a14="http://schemas.microsoft.com/office/drawing/2010/main" w="9525">
-                <a:solidFill>
-                  <a:schemeClr val="tx1"/>
-                </a:solidFill>
-                <a:miter lim="800000"/>
-                <a:headEnd/>
-                <a:tailEnd/>
-              </a14:hiddenLine>
-            </a:ext>
-            <a:ext uri="{AF507438-7753-43E0-B8FC-AC1667EBCBE1}">
-              <a14:hiddenEffects xmlns:a14="http://schemas.microsoft.com/office/drawing/2010/main">
-                <a:effectLst>
-                  <a:outerShdw dist="35921" dir="2700000" algn="ctr" rotWithShape="0">
-                    <a:schemeClr val="bg2"/>
-                  </a:outerShdw>
-                </a:effectLst>
-              </a14:hiddenEffects>
-            </a:ext>
-          </a:extLst>
-        </p:spPr>
-      </p:pic>
-      <p:sp>
-        <p:nvSpPr>
-          <p:cNvPr id="4" name="3 Marcador de fecha"/>
-          <p:cNvSpPr>
-            <a:spLocks noGrp="1"/>
-          </p:cNvSpPr>
-          <p:nvPr>
-            <p:ph type="dt" sz="half" idx="10"/>
-          </p:nvPr>
-        </p:nvSpPr>
-        <p:spPr/>
-        <p:txBody>
-          <a:bodyPr/>
-          <a:lstStyle/>
-          <a:p>
-            <a:fld id="{4BF39911-113C-4A32-96B8-5FEF0E534D9F}" type="datetime1">
-              <a:rPr lang="es-ES" smtClean="0"/>
-              <a:t>22/05/2014</a:t>
-            </a:fld>
-            <a:endParaRPr lang="es-ES"/>
-          </a:p>
-        </p:txBody>
-      </p:sp>
-      <p:sp>
-        <p:nvSpPr>
-          <p:cNvPr id="5" name="4 Marcador de pie de página"/>
-          <p:cNvSpPr>
-            <a:spLocks noGrp="1"/>
-          </p:cNvSpPr>
-          <p:nvPr>
-            <p:ph type="ftr" sz="quarter" idx="11"/>
-          </p:nvPr>
-        </p:nvSpPr>
-        <p:spPr/>
-        <p:txBody>
-          <a:bodyPr/>
-          <a:lstStyle/>
-          <a:p>
-            <a:r>
-              <a:rPr lang="es-AR" smtClean="0"/>
-              <a:t>Introducción a la Plataforma .NET – Capa de Presentacion</a:t>
-            </a:r>
-            <a:endParaRPr lang="es-ES"/>
-          </a:p>
-        </p:txBody>
-      </p:sp>
-      <p:sp>
-        <p:nvSpPr>
-          <p:cNvPr id="6" name="5 Marcador de número de diapositiva"/>
-          <p:cNvSpPr>
-            <a:spLocks noGrp="1"/>
-          </p:cNvSpPr>
-          <p:nvPr>
-            <p:ph type="sldNum" sz="quarter" idx="12"/>
-          </p:nvPr>
-        </p:nvSpPr>
-        <p:spPr/>
-        <p:txBody>
-          <a:bodyPr/>
-          <a:lstStyle/>
-          <a:p>
-            <a:fld id="{132FADFE-3B8F-471C-ABF0-DBC7717ECBBC}" type="slidenum">
-              <a:rPr lang="es-ES" smtClean="0"/>
-              <a:pPr/>
-              <a:t>46</a:t>
-            </a:fld>
-            <a:endParaRPr lang="es-ES"/>
-          </a:p>
-        </p:txBody>
-      </p:sp>
-    </p:spTree>
-    <p:extLst>
-      <p:ext uri="{BB962C8B-B14F-4D97-AF65-F5344CB8AC3E}">
-        <p14:creationId xmlns:p14="http://schemas.microsoft.com/office/powerpoint/2010/main" val="3752180473"/>
-      </p:ext>
-    </p:extLst>
-  </p:cSld>
-  <p:clrMapOvr>
-    <a:masterClrMapping/>
-  </p:clrMapOvr>
-  <p:timing>
-    <p:tnLst>
-      <p:par>
-        <p:cTn id="1" dur="indefinite" restart="never" nodeType="tmRoot"/>
-      </p:par>
-    </p:tnLst>
-  </p:timing>
-</p:sld>
-</file>
-
-<file path=ppt/slides/slide47.xml><?xml version="1.0" encoding="utf-8"?>
-<p:sld xmlns:a="http://schemas.openxmlformats.org/drawingml/2006/main" xmlns:r="http://schemas.openxmlformats.org/officeDocument/2006/relationships" xmlns:p="http://schemas.openxmlformats.org/presentationml/2006/main">
-  <p:cSld>
-    <p:spTree>
-      <p:nvGrpSpPr>
-        <p:cNvPr id="1" name=""/>
-        <p:cNvGrpSpPr/>
-        <p:nvPr/>
-      </p:nvGrpSpPr>
-      <p:grpSpPr>
-        <a:xfrm>
-          <a:off x="0" y="0"/>
-          <a:ext cx="0" cy="0"/>
-          <a:chOff x="0" y="0"/>
-          <a:chExt cx="0" cy="0"/>
-        </a:xfrm>
-      </p:grpSpPr>
-      <p:sp>
-        <p:nvSpPr>
-          <p:cNvPr id="3" name="2 Marcador de fecha"/>
-          <p:cNvSpPr>
-            <a:spLocks noGrp="1"/>
-          </p:cNvSpPr>
-          <p:nvPr>
-            <p:ph type="dt" sz="half" idx="10"/>
-          </p:nvPr>
-        </p:nvSpPr>
-        <p:spPr/>
-        <p:txBody>
-          <a:bodyPr/>
-          <a:lstStyle/>
-          <a:p>
-            <a:fld id="{89F5032E-2175-444E-9EC8-0A131EA1CD7F}" type="datetime1">
-              <a:rPr lang="es-ES" smtClean="0"/>
-              <a:t>22/05/2014</a:t>
-            </a:fld>
-            <a:endParaRPr lang="es-ES"/>
-          </a:p>
-        </p:txBody>
-      </p:sp>
-      <p:sp>
-        <p:nvSpPr>
-          <p:cNvPr id="4" name="3 Marcador de pie de página"/>
-          <p:cNvSpPr>
-            <a:spLocks noGrp="1"/>
-          </p:cNvSpPr>
-          <p:nvPr>
-            <p:ph type="ftr" sz="quarter" idx="11"/>
-          </p:nvPr>
-        </p:nvSpPr>
-        <p:spPr/>
-        <p:txBody>
-          <a:bodyPr/>
-          <a:lstStyle/>
-          <a:p>
-            <a:r>
-              <a:rPr lang="es-AR" smtClean="0"/>
-              <a:t>Introducción a la Plataforma .NET – Capa de Presentacion</a:t>
-            </a:r>
-            <a:endParaRPr lang="es-ES"/>
-          </a:p>
-        </p:txBody>
-      </p:sp>
-      <p:sp>
-        <p:nvSpPr>
           <p:cNvPr id="5" name="4 Marcador de número de diapositiva"/>
           <p:cNvSpPr>
             <a:spLocks noGrp="1"/>
@@ -38475,7 +35413,7 @@
             <a:fld id="{132FADFE-3B8F-471C-ABF0-DBC7717ECBBC}" type="slidenum">
               <a:rPr lang="es-ES" smtClean="0"/>
               <a:pPr/>
-              <a:t>47</a:t>
+              <a:t>41</a:t>
             </a:fld>
             <a:endParaRPr lang="es-ES"/>
           </a:p>
@@ -38699,7 +35637,7 @@
           <a:p>
             <a:fld id="{89F5032E-2175-444E-9EC8-0A131EA1CD7F}" type="datetime1">
               <a:rPr lang="es-ES" smtClean="0"/>
-              <a:t>22/05/2014</a:t>
+              <a:t>29/05/2014</a:t>
             </a:fld>
             <a:endParaRPr lang="es-ES"/>
           </a:p>
@@ -39511,7 +36449,7 @@
           <a:p>
             <a:fld id="{89F5032E-2175-444E-9EC8-0A131EA1CD7F}" type="datetime1">
               <a:rPr lang="es-ES" smtClean="0"/>
-              <a:t>22/05/2014</a:t>
+              <a:t>29/05/2014</a:t>
             </a:fld>
             <a:endParaRPr lang="es-ES"/>
           </a:p>
@@ -40837,7 +37775,7 @@
           <a:p>
             <a:fld id="{89F5032E-2175-444E-9EC8-0A131EA1CD7F}" type="datetime1">
               <a:rPr lang="es-ES" smtClean="0"/>
-              <a:t>22/05/2014</a:t>
+              <a:t>29/05/2014</a:t>
             </a:fld>
             <a:endParaRPr lang="es-ES"/>
           </a:p>
@@ -40976,6 +37914,104 @@
       </p:grpSpPr>
       <p:sp>
         <p:nvSpPr>
+          <p:cNvPr id="2" name="Marcador de contenido 1"/>
+          <p:cNvSpPr>
+            <a:spLocks noGrp="1"/>
+          </p:cNvSpPr>
+          <p:nvPr>
+            <p:ph idx="1"/>
+          </p:nvPr>
+        </p:nvSpPr>
+        <p:spPr>
+          <a:xfrm>
+            <a:off x="467545" y="1708436"/>
+            <a:ext cx="4685370" cy="4417727"/>
+          </a:xfrm>
+        </p:spPr>
+        <p:txBody>
+          <a:bodyPr>
+            <a:normAutofit/>
+          </a:bodyPr>
+          <a:lstStyle/>
+          <a:p>
+            <a:r>
+              <a:rPr lang="es-ES_tradnl" sz="2000" dirty="0" smtClean="0"/>
+              <a:t>Componentes</a:t>
+            </a:r>
+          </a:p>
+          <a:p>
+            <a:r>
+              <a:rPr lang="es-ES_tradnl" sz="2000" dirty="0" err="1" smtClean="0"/>
+              <a:t>IView</a:t>
+            </a:r>
+            <a:r>
+              <a:rPr lang="es-ES_tradnl" sz="2000" dirty="0" smtClean="0"/>
+              <a:t>: Interfaz con la que el </a:t>
+            </a:r>
+            <a:r>
+              <a:rPr lang="es-ES_tradnl" sz="2000" dirty="0" err="1" smtClean="0"/>
+              <a:t>presenter</a:t>
+            </a:r>
+            <a:r>
+              <a:rPr lang="es-ES_tradnl" sz="2000" dirty="0" smtClean="0"/>
+              <a:t> se comunica con la vista.</a:t>
+            </a:r>
+          </a:p>
+          <a:p>
+            <a:r>
+              <a:rPr lang="es-ES_tradnl" sz="2000" dirty="0" smtClean="0"/>
+              <a:t>View: </a:t>
+            </a:r>
+            <a:r>
+              <a:rPr lang="es-ES_tradnl" sz="2000" dirty="0" err="1" smtClean="0"/>
+              <a:t>Impementa</a:t>
+            </a:r>
+            <a:r>
+              <a:rPr lang="es-ES_tradnl" sz="2000" dirty="0" smtClean="0"/>
+              <a:t> </a:t>
+            </a:r>
+            <a:r>
+              <a:rPr lang="es-ES_tradnl" sz="2000" dirty="0" err="1" smtClean="0"/>
+              <a:t>IView</a:t>
+            </a:r>
+            <a:r>
+              <a:rPr lang="es-ES_tradnl" sz="2000" dirty="0" smtClean="0"/>
+              <a:t> y referencia al </a:t>
+            </a:r>
+            <a:r>
+              <a:rPr lang="es-ES_tradnl" sz="2000" dirty="0" err="1" smtClean="0"/>
+              <a:t>presenter</a:t>
+            </a:r>
+            <a:r>
+              <a:rPr lang="es-ES_tradnl" sz="2000" dirty="0" smtClean="0"/>
+              <a:t> a quien le delega el manejo de eventos.</a:t>
+            </a:r>
+          </a:p>
+          <a:p>
+            <a:r>
+              <a:rPr lang="es-ES_tradnl" sz="2000" dirty="0" err="1" smtClean="0"/>
+              <a:t>Presenter</a:t>
+            </a:r>
+            <a:r>
+              <a:rPr lang="es-ES_tradnl" sz="2000" dirty="0" smtClean="0"/>
+              <a:t>: Lógica de los eventos y el estado de la vista. Usa al modelo para responder a los eventos y maneja el estado de la vista.</a:t>
+            </a:r>
+          </a:p>
+          <a:p>
+            <a:r>
+              <a:rPr lang="es-ES_tradnl" sz="2000" dirty="0" err="1" smtClean="0"/>
+              <a:t>Model</a:t>
+            </a:r>
+            <a:r>
+              <a:rPr lang="es-ES_tradnl" sz="2000" dirty="0" smtClean="0"/>
+              <a:t>: Son los datos de la aplicación (Negocio)</a:t>
+            </a:r>
+            <a:endParaRPr lang="es-AR" sz="2000" dirty="0"/>
+          </a:p>
+        </p:txBody>
+      </p:sp>
+      <p:sp>
+        <p:nvSpPr>
           <p:cNvPr id="3" name="Marcador de fecha 2"/>
           <p:cNvSpPr>
             <a:spLocks noGrp="1"/>
@@ -40991,7 +38027,7 @@
           <a:p>
             <a:fld id="{89F5032E-2175-444E-9EC8-0A131EA1CD7F}" type="datetime1">
               <a:rPr lang="es-ES" smtClean="0"/>
-              <a:t>22/05/2014</a:t>
+              <a:t>29/05/2014</a:t>
             </a:fld>
             <a:endParaRPr lang="es-ES"/>
           </a:p>
@@ -41039,6 +38075,160 @@
               <a:rPr lang="es-ES" smtClean="0"/>
               <a:pPr/>
               <a:t>8</a:t>
+            </a:fld>
+            <a:endParaRPr lang="es-ES"/>
+          </a:p>
+        </p:txBody>
+      </p:sp>
+      <p:sp>
+        <p:nvSpPr>
+          <p:cNvPr id="6" name="Título 5"/>
+          <p:cNvSpPr>
+            <a:spLocks noGrp="1"/>
+          </p:cNvSpPr>
+          <p:nvPr>
+            <p:ph type="title"/>
+          </p:nvPr>
+        </p:nvSpPr>
+        <p:spPr/>
+        <p:txBody>
+          <a:bodyPr/>
+          <a:lstStyle/>
+          <a:p>
+            <a:r>
+              <a:rPr lang="es-ES_tradnl" dirty="0" smtClean="0"/>
+              <a:t>MVP</a:t>
+            </a:r>
+            <a:endParaRPr lang="es-AR" dirty="0"/>
+          </a:p>
+        </p:txBody>
+      </p:sp>
+      <p:pic>
+        <p:nvPicPr>
+          <p:cNvPr id="9" name="Imagen 8"/>
+          <p:cNvPicPr>
+            <a:picLocks noChangeAspect="1"/>
+          </p:cNvPicPr>
+          <p:nvPr/>
+        </p:nvPicPr>
+        <p:blipFill>
+          <a:blip r:embed="rId2"/>
+          <a:stretch>
+            <a:fillRect/>
+          </a:stretch>
+        </p:blipFill>
+        <p:spPr>
+          <a:xfrm>
+            <a:off x="5038578" y="3645024"/>
+            <a:ext cx="3934394" cy="2016224"/>
+          </a:xfrm>
+          <a:prstGeom prst="rect">
+            <a:avLst/>
+          </a:prstGeom>
+        </p:spPr>
+      </p:pic>
+    </p:spTree>
+    <p:extLst>
+      <p:ext uri="{BB962C8B-B14F-4D97-AF65-F5344CB8AC3E}">
+        <p14:creationId xmlns:p14="http://schemas.microsoft.com/office/powerpoint/2010/main" val="1535581293"/>
+      </p:ext>
+    </p:extLst>
+  </p:cSld>
+  <p:clrMapOvr>
+    <a:masterClrMapping/>
+  </p:clrMapOvr>
+  <p:timing>
+    <p:tnLst>
+      <p:par>
+        <p:cTn id="1" dur="indefinite" restart="never" nodeType="tmRoot"/>
+      </p:par>
+    </p:tnLst>
+  </p:timing>
+</p:sld>
+</file>
+
+<file path=ppt/slides/slide9.xml><?xml version="1.0" encoding="utf-8"?>
+<p:sld xmlns:a="http://schemas.openxmlformats.org/drawingml/2006/main" xmlns:r="http://schemas.openxmlformats.org/officeDocument/2006/relationships" xmlns:p="http://schemas.openxmlformats.org/presentationml/2006/main">
+  <p:cSld>
+    <p:spTree>
+      <p:nvGrpSpPr>
+        <p:cNvPr id="1" name=""/>
+        <p:cNvGrpSpPr/>
+        <p:nvPr/>
+      </p:nvGrpSpPr>
+      <p:grpSpPr>
+        <a:xfrm>
+          <a:off x="0" y="0"/>
+          <a:ext cx="0" cy="0"/>
+          <a:chOff x="0" y="0"/>
+          <a:chExt cx="0" cy="0"/>
+        </a:xfrm>
+      </p:grpSpPr>
+      <p:sp>
+        <p:nvSpPr>
+          <p:cNvPr id="3" name="Marcador de fecha 2"/>
+          <p:cNvSpPr>
+            <a:spLocks noGrp="1"/>
+          </p:cNvSpPr>
+          <p:nvPr>
+            <p:ph type="dt" sz="half" idx="10"/>
+          </p:nvPr>
+        </p:nvSpPr>
+        <p:spPr/>
+        <p:txBody>
+          <a:bodyPr/>
+          <a:lstStyle/>
+          <a:p>
+            <a:fld id="{89F5032E-2175-444E-9EC8-0A131EA1CD7F}" type="datetime1">
+              <a:rPr lang="es-ES" smtClean="0"/>
+              <a:t>29/05/2014</a:t>
+            </a:fld>
+            <a:endParaRPr lang="es-ES"/>
+          </a:p>
+        </p:txBody>
+      </p:sp>
+      <p:sp>
+        <p:nvSpPr>
+          <p:cNvPr id="4" name="Marcador de pie de página 3"/>
+          <p:cNvSpPr>
+            <a:spLocks noGrp="1"/>
+          </p:cNvSpPr>
+          <p:nvPr>
+            <p:ph type="ftr" sz="quarter" idx="11"/>
+          </p:nvPr>
+        </p:nvSpPr>
+        <p:spPr/>
+        <p:txBody>
+          <a:bodyPr/>
+          <a:lstStyle/>
+          <a:p>
+            <a:r>
+              <a:rPr lang="es-AR" smtClean="0"/>
+              <a:t>Introducción a la Plataforma .NET – Capa de Presentacion</a:t>
+            </a:r>
+            <a:endParaRPr lang="es-ES"/>
+          </a:p>
+        </p:txBody>
+      </p:sp>
+      <p:sp>
+        <p:nvSpPr>
+          <p:cNvPr id="5" name="Marcador de número de diapositiva 4"/>
+          <p:cNvSpPr>
+            <a:spLocks noGrp="1"/>
+          </p:cNvSpPr>
+          <p:nvPr>
+            <p:ph type="sldNum" sz="quarter" idx="12"/>
+          </p:nvPr>
+        </p:nvSpPr>
+        <p:spPr/>
+        <p:txBody>
+          <a:bodyPr/>
+          <a:lstStyle/>
+          <a:p>
+            <a:fld id="{132FADFE-3B8F-471C-ABF0-DBC7717ECBBC}" type="slidenum">
+              <a:rPr lang="es-ES" smtClean="0"/>
+              <a:pPr/>
+              <a:t>9</a:t>
             </a:fld>
             <a:endParaRPr lang="es-ES"/>
           </a:p>
@@ -41120,258 +38310,6 @@
   <p:clrMapOvr>
     <a:masterClrMapping/>
   </p:clrMapOvr>
-</p:sld>
-</file>
-
-<file path=ppt/slides/slide9.xml><?xml version="1.0" encoding="utf-8"?>
-<p:sld xmlns:a="http://schemas.openxmlformats.org/drawingml/2006/main" xmlns:r="http://schemas.openxmlformats.org/officeDocument/2006/relationships" xmlns:p="http://schemas.openxmlformats.org/presentationml/2006/main">
-  <p:cSld>
-    <p:spTree>
-      <p:nvGrpSpPr>
-        <p:cNvPr id="1" name=""/>
-        <p:cNvGrpSpPr/>
-        <p:nvPr/>
-      </p:nvGrpSpPr>
-      <p:grpSpPr>
-        <a:xfrm>
-          <a:off x="0" y="0"/>
-          <a:ext cx="0" cy="0"/>
-          <a:chOff x="0" y="0"/>
-          <a:chExt cx="0" cy="0"/>
-        </a:xfrm>
-      </p:grpSpPr>
-      <p:sp>
-        <p:nvSpPr>
-          <p:cNvPr id="2" name="Marcador de contenido 1"/>
-          <p:cNvSpPr>
-            <a:spLocks noGrp="1"/>
-          </p:cNvSpPr>
-          <p:nvPr>
-            <p:ph idx="1"/>
-          </p:nvPr>
-        </p:nvSpPr>
-        <p:spPr>
-          <a:xfrm>
-            <a:off x="467545" y="1708436"/>
-            <a:ext cx="4685370" cy="4417727"/>
-          </a:xfrm>
-        </p:spPr>
-        <p:txBody>
-          <a:bodyPr>
-            <a:normAutofit/>
-          </a:bodyPr>
-          <a:lstStyle/>
-          <a:p>
-            <a:r>
-              <a:rPr lang="es-ES_tradnl" sz="2000" dirty="0" smtClean="0"/>
-              <a:t>Componentes</a:t>
-            </a:r>
-          </a:p>
-          <a:p>
-            <a:r>
-              <a:rPr lang="es-ES_tradnl" sz="2000" dirty="0" err="1" smtClean="0"/>
-              <a:t>IView</a:t>
-            </a:r>
-            <a:r>
-              <a:rPr lang="es-ES_tradnl" sz="2000" dirty="0" smtClean="0"/>
-              <a:t>: Interfaz con la que el </a:t>
-            </a:r>
-            <a:r>
-              <a:rPr lang="es-ES_tradnl" sz="2000" dirty="0" err="1" smtClean="0"/>
-              <a:t>presenter</a:t>
-            </a:r>
-            <a:r>
-              <a:rPr lang="es-ES_tradnl" sz="2000" dirty="0" smtClean="0"/>
-              <a:t> se comunica con la vista.</a:t>
-            </a:r>
-          </a:p>
-          <a:p>
-            <a:r>
-              <a:rPr lang="es-ES_tradnl" sz="2000" dirty="0" smtClean="0"/>
-              <a:t>View: </a:t>
-            </a:r>
-            <a:r>
-              <a:rPr lang="es-ES_tradnl" sz="2000" dirty="0" err="1" smtClean="0"/>
-              <a:t>Impementa</a:t>
-            </a:r>
-            <a:r>
-              <a:rPr lang="es-ES_tradnl" sz="2000" dirty="0" smtClean="0"/>
-              <a:t> </a:t>
-            </a:r>
-            <a:r>
-              <a:rPr lang="es-ES_tradnl" sz="2000" dirty="0" err="1" smtClean="0"/>
-              <a:t>IView</a:t>
-            </a:r>
-            <a:r>
-              <a:rPr lang="es-ES_tradnl" sz="2000" dirty="0" smtClean="0"/>
-              <a:t> y referencia al </a:t>
-            </a:r>
-            <a:r>
-              <a:rPr lang="es-ES_tradnl" sz="2000" dirty="0" err="1" smtClean="0"/>
-              <a:t>presenter</a:t>
-            </a:r>
-            <a:r>
-              <a:rPr lang="es-ES_tradnl" sz="2000" dirty="0" smtClean="0"/>
-              <a:t> a quien le delega el manejo de eventos.</a:t>
-            </a:r>
-          </a:p>
-          <a:p>
-            <a:r>
-              <a:rPr lang="es-ES_tradnl" sz="2000" dirty="0" err="1" smtClean="0"/>
-              <a:t>Presenter</a:t>
-            </a:r>
-            <a:r>
-              <a:rPr lang="es-ES_tradnl" sz="2000" dirty="0" smtClean="0"/>
-              <a:t>: Lógica de los eventos y el estado de la vista. Usa al modelo para responder a los eventos y maneja el estado de la vista.</a:t>
-            </a:r>
-          </a:p>
-          <a:p>
-            <a:r>
-              <a:rPr lang="es-ES_tradnl" sz="2000" dirty="0" err="1" smtClean="0"/>
-              <a:t>Model</a:t>
-            </a:r>
-            <a:r>
-              <a:rPr lang="es-ES_tradnl" sz="2000" dirty="0" smtClean="0"/>
-              <a:t>: Son los datos de la aplicación (Negocio)</a:t>
-            </a:r>
-            <a:endParaRPr lang="es-AR" sz="2000" dirty="0"/>
-          </a:p>
-        </p:txBody>
-      </p:sp>
-      <p:sp>
-        <p:nvSpPr>
-          <p:cNvPr id="3" name="Marcador de fecha 2"/>
-          <p:cNvSpPr>
-            <a:spLocks noGrp="1"/>
-          </p:cNvSpPr>
-          <p:nvPr>
-            <p:ph type="dt" sz="half" idx="10"/>
-          </p:nvPr>
-        </p:nvSpPr>
-        <p:spPr/>
-        <p:txBody>
-          <a:bodyPr/>
-          <a:lstStyle/>
-          <a:p>
-            <a:fld id="{89F5032E-2175-444E-9EC8-0A131EA1CD7F}" type="datetime1">
-              <a:rPr lang="es-ES" smtClean="0"/>
-              <a:t>22/05/2014</a:t>
-            </a:fld>
-            <a:endParaRPr lang="es-ES"/>
-          </a:p>
-        </p:txBody>
-      </p:sp>
-      <p:sp>
-        <p:nvSpPr>
-          <p:cNvPr id="4" name="Marcador de pie de página 3"/>
-          <p:cNvSpPr>
-            <a:spLocks noGrp="1"/>
-          </p:cNvSpPr>
-          <p:nvPr>
-            <p:ph type="ftr" sz="quarter" idx="11"/>
-          </p:nvPr>
-        </p:nvSpPr>
-        <p:spPr/>
-        <p:txBody>
-          <a:bodyPr/>
-          <a:lstStyle/>
-          <a:p>
-            <a:r>
-              <a:rPr lang="es-AR" smtClean="0"/>
-              <a:t>Introducción a la Plataforma .NET – Capa de Presentacion</a:t>
-            </a:r>
-            <a:endParaRPr lang="es-ES"/>
-          </a:p>
-        </p:txBody>
-      </p:sp>
-      <p:sp>
-        <p:nvSpPr>
-          <p:cNvPr id="5" name="Marcador de número de diapositiva 4"/>
-          <p:cNvSpPr>
-            <a:spLocks noGrp="1"/>
-          </p:cNvSpPr>
-          <p:nvPr>
-            <p:ph type="sldNum" sz="quarter" idx="12"/>
-          </p:nvPr>
-        </p:nvSpPr>
-        <p:spPr/>
-        <p:txBody>
-          <a:bodyPr/>
-          <a:lstStyle/>
-          <a:p>
-            <a:fld id="{132FADFE-3B8F-471C-ABF0-DBC7717ECBBC}" type="slidenum">
-              <a:rPr lang="es-ES" smtClean="0"/>
-              <a:pPr/>
-              <a:t>9</a:t>
-            </a:fld>
-            <a:endParaRPr lang="es-ES"/>
-          </a:p>
-        </p:txBody>
-      </p:sp>
-      <p:sp>
-        <p:nvSpPr>
-          <p:cNvPr id="6" name="Título 5"/>
-          <p:cNvSpPr>
-            <a:spLocks noGrp="1"/>
-          </p:cNvSpPr>
-          <p:nvPr>
-            <p:ph type="title"/>
-          </p:nvPr>
-        </p:nvSpPr>
-        <p:spPr/>
-        <p:txBody>
-          <a:bodyPr/>
-          <a:lstStyle/>
-          <a:p>
-            <a:r>
-              <a:rPr lang="es-ES_tradnl" dirty="0" smtClean="0"/>
-              <a:t>MVP</a:t>
-            </a:r>
-            <a:endParaRPr lang="es-AR" dirty="0"/>
-          </a:p>
-        </p:txBody>
-      </p:sp>
-      <p:pic>
-        <p:nvPicPr>
-          <p:cNvPr id="9" name="Imagen 8"/>
-          <p:cNvPicPr>
-            <a:picLocks noChangeAspect="1"/>
-          </p:cNvPicPr>
-          <p:nvPr/>
-        </p:nvPicPr>
-        <p:blipFill>
-          <a:blip r:embed="rId2"/>
-          <a:stretch>
-            <a:fillRect/>
-          </a:stretch>
-        </p:blipFill>
-        <p:spPr>
-          <a:xfrm>
-            <a:off x="5038578" y="3645024"/>
-            <a:ext cx="3934394" cy="2016224"/>
-          </a:xfrm>
-          <a:prstGeom prst="rect">
-            <a:avLst/>
-          </a:prstGeom>
-        </p:spPr>
-      </p:pic>
-    </p:spTree>
-    <p:extLst>
-      <p:ext uri="{BB962C8B-B14F-4D97-AF65-F5344CB8AC3E}">
-        <p14:creationId xmlns:p14="http://schemas.microsoft.com/office/powerpoint/2010/main" val="1535581293"/>
-      </p:ext>
-    </p:extLst>
-  </p:cSld>
-  <p:clrMapOvr>
-    <a:masterClrMapping/>
-  </p:clrMapOvr>
-  <p:timing>
-    <p:tnLst>
-      <p:par>
-        <p:cTn id="1" dur="indefinite" restart="never" nodeType="tmRoot"/>
-      </p:par>
-    </p:tnLst>
-  </p:timing>
 </p:sld>
 </file>
 

</xml_diff>